<commit_message>
Giannis changed binning so I need to make changes and run files on lxplus
</commit_message>
<xml_diff>
--- a/Zprime/StatusReports/HEP_Weekly_28Oct2020.pptx
+++ b/Zprime/StatusReports/HEP_Weekly_28Oct2020.pptx
@@ -6,22 +6,25 @@
     <p:sldMasterId id="2147483661" r:id="rId2"/>
   </p:sldMasterIdLst>
   <p:notesMasterIdLst>
-    <p:notesMasterId r:id="rId13"/>
+    <p:notesMasterId r:id="rId16"/>
   </p:notesMasterIdLst>
   <p:handoutMasterIdLst>
-    <p:handoutMasterId r:id="rId14"/>
+    <p:handoutMasterId r:id="rId17"/>
   </p:handoutMasterIdLst>
   <p:sldIdLst>
     <p:sldId id="256" r:id="rId3"/>
     <p:sldId id="568" r:id="rId4"/>
     <p:sldId id="593" r:id="rId5"/>
     <p:sldId id="585" r:id="rId6"/>
-    <p:sldId id="594" r:id="rId7"/>
-    <p:sldId id="595" r:id="rId8"/>
-    <p:sldId id="596" r:id="rId9"/>
-    <p:sldId id="588" r:id="rId10"/>
-    <p:sldId id="507" r:id="rId11"/>
-    <p:sldId id="587" r:id="rId12"/>
+    <p:sldId id="598" r:id="rId7"/>
+    <p:sldId id="600" r:id="rId8"/>
+    <p:sldId id="597" r:id="rId9"/>
+    <p:sldId id="594" r:id="rId10"/>
+    <p:sldId id="601" r:id="rId11"/>
+    <p:sldId id="596" r:id="rId12"/>
+    <p:sldId id="588" r:id="rId13"/>
+    <p:sldId id="507" r:id="rId14"/>
+    <p:sldId id="587" r:id="rId15"/>
   </p:sldIdLst>
   <p:sldSz cx="12192000" cy="6858000"/>
   <p:notesSz cx="6858000" cy="9144000"/>
@@ -7656,10 +7659,40 @@
       </p:sp>
       <p:sp>
         <p:nvSpPr>
-          <p:cNvPr id="12" name="Title 4">
+          <p:cNvPr id="2" name="Slide Number Placeholder 1">
             <a:extLst>
               <a:ext uri="{FF2B5EF4-FFF2-40B4-BE49-F238E27FC236}">
-                <a16:creationId xmlns:a16="http://schemas.microsoft.com/office/drawing/2014/main" id="{CCE472BB-DFA4-B349-8F30-2673C528FF7C}"/>
+                <a16:creationId xmlns:a16="http://schemas.microsoft.com/office/drawing/2014/main" id="{AA422B14-CFD2-DA45-ABB4-F85273D6A99E}"/>
+              </a:ext>
+            </a:extLst>
+          </p:cNvPr>
+          <p:cNvSpPr>
+            <a:spLocks noGrp="1"/>
+          </p:cNvSpPr>
+          <p:nvPr>
+            <p:ph type="sldNum" sz="quarter" idx="12"/>
+          </p:nvPr>
+        </p:nvSpPr>
+        <p:spPr/>
+        <p:txBody>
+          <a:bodyPr/>
+          <a:lstStyle/>
+          <a:p>
+            <a:fld id="{4FAB73BC-B049-4115-A692-8D63A059BFB8}" type="slidenum">
+              <a:rPr lang="en-US" smtClean="0"/>
+              <a:pPr/>
+              <a:t>10</a:t>
+            </a:fld>
+            <a:endParaRPr lang="en-US" dirty="0"/>
+          </a:p>
+        </p:txBody>
+      </p:sp>
+      <p:sp>
+        <p:nvSpPr>
+          <p:cNvPr id="7" name="Title 4">
+            <a:extLst>
+              <a:ext uri="{FF2B5EF4-FFF2-40B4-BE49-F238E27FC236}">
+                <a16:creationId xmlns:a16="http://schemas.microsoft.com/office/drawing/2014/main" id="{17B766C6-A25E-7846-9053-B6684037C65A}"/>
               </a:ext>
             </a:extLst>
           </p:cNvPr>
@@ -7670,8 +7703,8 @@
         </p:nvSpPr>
         <p:spPr>
           <a:xfrm>
-            <a:off x="182879" y="115590"/>
-            <a:ext cx="10520413" cy="600982"/>
+            <a:off x="833491" y="-26870"/>
+            <a:ext cx="10520413" cy="481238"/>
           </a:xfrm>
           <a:prstGeom prst="rect">
             <a:avLst/>
@@ -7704,10 +7737,189 @@
             </a:lvl1pPr>
           </a:lstStyle>
           <a:p>
-            <a:r>
-              <a:rPr lang="en-GB" sz="3600" u="sng" dirty="0"/>
-              <a:t>Top Angular Distributions</a:t>
-            </a:r>
+            <a:pPr algn="ctr"/>
+            <a:r>
+              <a:rPr lang="en-GB" sz="2800" u="sng" dirty="0"/>
+              <a:t>Angular Distributions (Brazilian Plot)</a:t>
+            </a:r>
+            <a:endParaRPr lang="en-GB" sz="2800" u="sng" dirty="0">
+              <a:solidFill>
+                <a:srgbClr val="FF0000"/>
+              </a:solidFill>
+            </a:endParaRPr>
+          </a:p>
+        </p:txBody>
+      </p:sp>
+      <p:pic>
+        <p:nvPicPr>
+          <p:cNvPr id="4" name="Picture 3" descr="Chart&#10;&#10;Description automatically generated">
+            <a:extLst>
+              <a:ext uri="{FF2B5EF4-FFF2-40B4-BE49-F238E27FC236}">
+                <a16:creationId xmlns:a16="http://schemas.microsoft.com/office/drawing/2014/main" id="{BED89E6E-6FE3-DE49-888F-410649971EA2}"/>
+              </a:ext>
+            </a:extLst>
+          </p:cNvPr>
+          <p:cNvPicPr>
+            <a:picLocks noChangeAspect="1"/>
+          </p:cNvPicPr>
+          <p:nvPr/>
+        </p:nvPicPr>
+        <p:blipFill>
+          <a:blip r:embed="rId2"/>
+          <a:stretch>
+            <a:fillRect/>
+          </a:stretch>
+        </p:blipFill>
+        <p:spPr>
+          <a:xfrm>
+            <a:off x="413717" y="1981879"/>
+            <a:ext cx="5560060" cy="3995420"/>
+          </a:xfrm>
+          <a:prstGeom prst="rect">
+            <a:avLst/>
+          </a:prstGeom>
+        </p:spPr>
+      </p:pic>
+      <p:pic>
+        <p:nvPicPr>
+          <p:cNvPr id="6" name="Picture 5" descr="Chart&#10;&#10;Description automatically generated">
+            <a:extLst>
+              <a:ext uri="{FF2B5EF4-FFF2-40B4-BE49-F238E27FC236}">
+                <a16:creationId xmlns:a16="http://schemas.microsoft.com/office/drawing/2014/main" id="{E95DD7D9-A510-7E42-8599-67B7D9BD7CA2}"/>
+              </a:ext>
+            </a:extLst>
+          </p:cNvPr>
+          <p:cNvPicPr>
+            <a:picLocks noChangeAspect="1"/>
+          </p:cNvPicPr>
+          <p:nvPr/>
+        </p:nvPicPr>
+        <p:blipFill>
+          <a:blip r:embed="rId3"/>
+          <a:stretch>
+            <a:fillRect/>
+          </a:stretch>
+        </p:blipFill>
+        <p:spPr>
+          <a:xfrm>
+            <a:off x="6113293" y="1981879"/>
+            <a:ext cx="5560060" cy="3995420"/>
+          </a:xfrm>
+          <a:prstGeom prst="rect">
+            <a:avLst/>
+          </a:prstGeom>
+        </p:spPr>
+      </p:pic>
+      <p:sp>
+        <p:nvSpPr>
+          <p:cNvPr id="8" name="TextBox 7">
+            <a:extLst>
+              <a:ext uri="{FF2B5EF4-FFF2-40B4-BE49-F238E27FC236}">
+                <a16:creationId xmlns:a16="http://schemas.microsoft.com/office/drawing/2014/main" id="{52270E51-8590-1445-A479-6F585D764111}"/>
+              </a:ext>
+            </a:extLst>
+          </p:cNvPr>
+          <p:cNvSpPr txBox="1"/>
+          <p:nvPr/>
+        </p:nvSpPr>
+        <p:spPr>
+          <a:xfrm>
+            <a:off x="893777" y="613688"/>
+            <a:ext cx="5080000" cy="646331"/>
+          </a:xfrm>
+          <a:prstGeom prst="rect">
+            <a:avLst/>
+          </a:prstGeom>
+          <a:noFill/>
+        </p:spPr>
+        <p:txBody>
+          <a:bodyPr wrap="square" rtlCol="0">
+            <a:spAutoFit/>
+          </a:bodyPr>
+          <a:lstStyle/>
+          <a:p>
+            <a:r>
+              <a:rPr lang="en-GR" dirty="0"/>
+              <a:t>Assymptotic limits for M Z’: 2000, 2500, 3000:</a:t>
+            </a:r>
+          </a:p>
+          <a:p>
+            <a:pPr marL="285750" indent="-285750">
+              <a:buFont typeface="Arial" panose="020B0604020202020204" pitchFamily="34" charset="0"/>
+              <a:buChar char="•"/>
+            </a:pPr>
+            <a:r>
+              <a:rPr lang="en-GR" dirty="0"/>
+              <a:t>Width 1% (left) and 10% (right)  </a:t>
+            </a:r>
+          </a:p>
+        </p:txBody>
+      </p:sp>
+    </p:spTree>
+    <p:extLst>
+      <p:ext uri="{BB962C8B-B14F-4D97-AF65-F5344CB8AC3E}">
+        <p14:creationId xmlns:p14="http://schemas.microsoft.com/office/powerpoint/2010/main" val="3913691451"/>
+      </p:ext>
+    </p:extLst>
+  </p:cSld>
+  <p:clrMapOvr>
+    <a:masterClrMapping/>
+  </p:clrMapOvr>
+</p:sld>
+</file>
+
+<file path=ppt/slides/slide11.xml><?xml version="1.0" encoding="utf-8"?>
+<p:sld xmlns:a="http://schemas.openxmlformats.org/drawingml/2006/main" xmlns:r="http://schemas.openxmlformats.org/officeDocument/2006/relationships" xmlns:p="http://schemas.openxmlformats.org/presentationml/2006/main">
+  <p:cSld>
+    <p:spTree>
+      <p:nvGrpSpPr>
+        <p:cNvPr id="1" name=""/>
+        <p:cNvGrpSpPr/>
+        <p:nvPr/>
+      </p:nvGrpSpPr>
+      <p:grpSpPr>
+        <a:xfrm>
+          <a:off x="0" y="0"/>
+          <a:ext cx="0" cy="0"/>
+          <a:chOff x="0" y="0"/>
+          <a:chExt cx="0" cy="0"/>
+        </a:xfrm>
+      </p:grpSpPr>
+      <p:sp>
+        <p:nvSpPr>
+          <p:cNvPr id="11" name="Footer Placeholder 7">
+            <a:extLst>
+              <a:ext uri="{FF2B5EF4-FFF2-40B4-BE49-F238E27FC236}">
+                <a16:creationId xmlns:a16="http://schemas.microsoft.com/office/drawing/2014/main" id="{59E26047-BD3C-504E-B955-20FE5C8AA1AA}"/>
+              </a:ext>
+            </a:extLst>
+          </p:cNvPr>
+          <p:cNvSpPr>
+            <a:spLocks noGrp="1"/>
+          </p:cNvSpPr>
+          <p:nvPr>
+            <p:ph type="ftr" sz="quarter" idx="11"/>
+          </p:nvPr>
+        </p:nvSpPr>
+        <p:spPr>
+          <a:xfrm>
+            <a:off x="3686185" y="6459785"/>
+            <a:ext cx="4822804" cy="365125"/>
+          </a:xfrm>
+        </p:spPr>
+        <p:txBody>
+          <a:bodyPr/>
+          <a:lstStyle/>
+          <a:p>
+            <a:r>
+              <a:rPr lang="fi-FI" dirty="0"/>
+              <a:t>NTUA G. </a:t>
+            </a:r>
+            <a:r>
+              <a:rPr lang="fi-FI" dirty="0" err="1"/>
+              <a:t>Bakas</a:t>
+            </a:r>
+            <a:endParaRPr lang="en-US" dirty="0"/>
           </a:p>
         </p:txBody>
       </p:sp>
@@ -7735,7 +7947,1370 @@
             <a:fld id="{4FAB73BC-B049-4115-A692-8D63A059BFB8}" type="slidenum">
               <a:rPr lang="en-US" smtClean="0"/>
               <a:pPr/>
-              <a:t>10</a:t>
+              <a:t>11</a:t>
+            </a:fld>
+            <a:endParaRPr lang="en-US" dirty="0"/>
+          </a:p>
+        </p:txBody>
+      </p:sp>
+      <p:sp>
+        <p:nvSpPr>
+          <p:cNvPr id="7" name="Title 4">
+            <a:extLst>
+              <a:ext uri="{FF2B5EF4-FFF2-40B4-BE49-F238E27FC236}">
+                <a16:creationId xmlns:a16="http://schemas.microsoft.com/office/drawing/2014/main" id="{17B766C6-A25E-7846-9053-B6684037C65A}"/>
+              </a:ext>
+            </a:extLst>
+          </p:cNvPr>
+          <p:cNvSpPr txBox="1">
+            <a:spLocks/>
+          </p:cNvSpPr>
+          <p:nvPr/>
+        </p:nvSpPr>
+        <p:spPr>
+          <a:xfrm>
+            <a:off x="835793" y="2828018"/>
+            <a:ext cx="10520413" cy="600982"/>
+          </a:xfrm>
+          <a:prstGeom prst="rect">
+            <a:avLst/>
+          </a:prstGeom>
+        </p:spPr>
+        <p:txBody>
+          <a:bodyPr vert="horz" lIns="91440" tIns="45720" rIns="91440" bIns="45720" rtlCol="0" anchor="b">
+            <a:noAutofit/>
+          </a:bodyPr>
+          <a:lstStyle>
+            <a:lvl1pPr algn="l" defTabSz="914400" rtl="0" eaLnBrk="1" latinLnBrk="0" hangingPunct="1">
+              <a:lnSpc>
+                <a:spcPct val="85000"/>
+              </a:lnSpc>
+              <a:spcBef>
+                <a:spcPct val="0"/>
+              </a:spcBef>
+              <a:buNone/>
+              <a:defRPr sz="4800" kern="1200" spc="-50" baseline="0">
+                <a:solidFill>
+                  <a:schemeClr val="tx1">
+                    <a:lumMod val="75000"/>
+                    <a:lumOff val="25000"/>
+                  </a:schemeClr>
+                </a:solidFill>
+                <a:latin typeface="+mj-lt"/>
+                <a:ea typeface="+mj-ea"/>
+                <a:cs typeface="+mj-cs"/>
+              </a:defRPr>
+            </a:lvl1pPr>
+          </a:lstStyle>
+          <a:p>
+            <a:pPr algn="ctr"/>
+            <a:r>
+              <a:rPr lang="en-GB" sz="2800" u="sng" dirty="0"/>
+              <a:t>BACKUP</a:t>
+            </a:r>
+          </a:p>
+        </p:txBody>
+      </p:sp>
+    </p:spTree>
+    <p:extLst>
+      <p:ext uri="{BB962C8B-B14F-4D97-AF65-F5344CB8AC3E}">
+        <p14:creationId xmlns:p14="http://schemas.microsoft.com/office/powerpoint/2010/main" val="1485357141"/>
+      </p:ext>
+    </p:extLst>
+  </p:cSld>
+  <p:clrMapOvr>
+    <a:masterClrMapping/>
+  </p:clrMapOvr>
+</p:sld>
+</file>
+
+<file path=ppt/slides/slide12.xml><?xml version="1.0" encoding="utf-8"?>
+<p:sld xmlns:a="http://schemas.openxmlformats.org/drawingml/2006/main" xmlns:r="http://schemas.openxmlformats.org/officeDocument/2006/relationships" xmlns:p="http://schemas.openxmlformats.org/presentationml/2006/main">
+  <p:cSld>
+    <p:spTree>
+      <p:nvGrpSpPr>
+        <p:cNvPr id="1" name=""/>
+        <p:cNvGrpSpPr/>
+        <p:nvPr/>
+      </p:nvGrpSpPr>
+      <p:grpSpPr>
+        <a:xfrm>
+          <a:off x="0" y="0"/>
+          <a:ext cx="0" cy="0"/>
+          <a:chOff x="0" y="0"/>
+          <a:chExt cx="0" cy="0"/>
+        </a:xfrm>
+      </p:grpSpPr>
+      <p:sp>
+        <p:nvSpPr>
+          <p:cNvPr id="3" name="Footer Placeholder 2"/>
+          <p:cNvSpPr>
+            <a:spLocks noGrp="1"/>
+          </p:cNvSpPr>
+          <p:nvPr>
+            <p:ph type="ftr" sz="quarter" idx="11"/>
+          </p:nvPr>
+        </p:nvSpPr>
+        <p:spPr/>
+        <p:txBody>
+          <a:bodyPr/>
+          <a:lstStyle/>
+          <a:p>
+            <a:r>
+              <a:rPr lang="fi-FI" dirty="0"/>
+              <a:t>NTUA G. </a:t>
+            </a:r>
+            <a:r>
+              <a:rPr lang="fi-FI" dirty="0" err="1"/>
+              <a:t>Bakas</a:t>
+            </a:r>
+            <a:endParaRPr lang="en-US" dirty="0"/>
+          </a:p>
+        </p:txBody>
+      </p:sp>
+      <p:sp>
+        <p:nvSpPr>
+          <p:cNvPr id="6" name="TextBox 5">
+            <a:extLst>
+              <a:ext uri="{FF2B5EF4-FFF2-40B4-BE49-F238E27FC236}">
+                <a16:creationId xmlns:a16="http://schemas.microsoft.com/office/drawing/2014/main" id="{1DDE6F7F-FC19-F840-A70E-C84BA99E0247}"/>
+              </a:ext>
+            </a:extLst>
+          </p:cNvPr>
+          <p:cNvSpPr txBox="1"/>
+          <p:nvPr/>
+        </p:nvSpPr>
+        <p:spPr>
+          <a:xfrm>
+            <a:off x="2574438" y="65430"/>
+            <a:ext cx="1990226" cy="430887"/>
+          </a:xfrm>
+          <a:prstGeom prst="rect">
+            <a:avLst/>
+          </a:prstGeom>
+          <a:noFill/>
+        </p:spPr>
+        <p:txBody>
+          <a:bodyPr wrap="square" rtlCol="0">
+            <a:spAutoFit/>
+          </a:bodyPr>
+          <a:lstStyle/>
+          <a:p>
+            <a:r>
+              <a:rPr lang="en-US" sz="2200" dirty="0">
+                <a:solidFill>
+                  <a:srgbClr val="00B050"/>
+                </a:solidFill>
+                <a:sym typeface="Wingdings" pitchFamily="2" charset="2"/>
+              </a:rPr>
+              <a:t>Signal Selection</a:t>
+            </a:r>
+          </a:p>
+        </p:txBody>
+      </p:sp>
+      <p:sp>
+        <p:nvSpPr>
+          <p:cNvPr id="5" name="Slide Number Placeholder 4">
+            <a:extLst>
+              <a:ext uri="{FF2B5EF4-FFF2-40B4-BE49-F238E27FC236}">
+                <a16:creationId xmlns:a16="http://schemas.microsoft.com/office/drawing/2014/main" id="{69A96869-DB60-5345-ACD9-F1C41035B064}"/>
+              </a:ext>
+            </a:extLst>
+          </p:cNvPr>
+          <p:cNvSpPr>
+            <a:spLocks noGrp="1"/>
+          </p:cNvSpPr>
+          <p:nvPr>
+            <p:ph type="sldNum" sz="quarter" idx="12"/>
+          </p:nvPr>
+        </p:nvSpPr>
+        <p:spPr/>
+        <p:txBody>
+          <a:bodyPr/>
+          <a:lstStyle/>
+          <a:p>
+            <a:fld id="{4FAB73BC-B049-4115-A692-8D63A059BFB8}" type="slidenum">
+              <a:rPr lang="en-US" smtClean="0"/>
+              <a:pPr/>
+              <a:t>12</a:t>
+            </a:fld>
+            <a:endParaRPr lang="en-US" dirty="0"/>
+          </a:p>
+        </p:txBody>
+      </p:sp>
+      <p:sp>
+        <p:nvSpPr>
+          <p:cNvPr id="24" name="Date Placeholder 23">
+            <a:extLst>
+              <a:ext uri="{FF2B5EF4-FFF2-40B4-BE49-F238E27FC236}">
+                <a16:creationId xmlns:a16="http://schemas.microsoft.com/office/drawing/2014/main" id="{056D71EF-2E89-4043-8F92-90A4D46A3E69}"/>
+              </a:ext>
+            </a:extLst>
+          </p:cNvPr>
+          <p:cNvSpPr>
+            <a:spLocks noGrp="1"/>
+          </p:cNvSpPr>
+          <p:nvPr>
+            <p:ph type="dt" sz="half" idx="10"/>
+          </p:nvPr>
+        </p:nvSpPr>
+        <p:spPr/>
+        <p:txBody>
+          <a:bodyPr/>
+          <a:lstStyle/>
+          <a:p>
+            <a:fld id="{F7AFF6A5-F1FB-284A-BF72-2836D5A0B341}" type="datetime1">
+              <a:rPr lang="en-US" smtClean="0"/>
+              <a:t>10/28/20</a:t>
+            </a:fld>
+            <a:endParaRPr lang="en-US" dirty="0"/>
+          </a:p>
+        </p:txBody>
+      </p:sp>
+      <p:graphicFrame>
+        <p:nvGraphicFramePr>
+          <p:cNvPr id="4" name="Table 3">
+            <a:extLst>
+              <a:ext uri="{FF2B5EF4-FFF2-40B4-BE49-F238E27FC236}">
+                <a16:creationId xmlns:a16="http://schemas.microsoft.com/office/drawing/2014/main" id="{9FB11E00-21A0-484F-B127-1B964919B378}"/>
+              </a:ext>
+            </a:extLst>
+          </p:cNvPr>
+          <p:cNvGraphicFramePr>
+            <a:graphicFrameLocks noGrp="1"/>
+          </p:cNvGraphicFramePr>
+          <p:nvPr/>
+        </p:nvGraphicFramePr>
+        <p:xfrm>
+          <a:off x="1348101" y="557850"/>
+          <a:ext cx="4368118" cy="5455057"/>
+        </p:xfrm>
+        <a:graphic>
+          <a:graphicData uri="http://schemas.openxmlformats.org/drawingml/2006/table">
+            <a:tbl>
+              <a:tblPr firstRow="1" bandRow="1">
+                <a:tableStyleId>{46F890A9-2807-4EBB-B81D-B2AA78EC7F39}</a:tableStyleId>
+              </a:tblPr>
+              <a:tblGrid>
+                <a:gridCol w="2184059">
+                  <a:extLst>
+                    <a:ext uri="{9D8B030D-6E8A-4147-A177-3AD203B41FA5}">
+                      <a16:colId xmlns:a16="http://schemas.microsoft.com/office/drawing/2014/main" val="3731337435"/>
+                    </a:ext>
+                  </a:extLst>
+                </a:gridCol>
+                <a:gridCol w="2184059">
+                  <a:extLst>
+                    <a:ext uri="{9D8B030D-6E8A-4147-A177-3AD203B41FA5}">
+                      <a16:colId xmlns:a16="http://schemas.microsoft.com/office/drawing/2014/main" val="3688698510"/>
+                    </a:ext>
+                  </a:extLst>
+                </a:gridCol>
+              </a:tblGrid>
+              <a:tr h="462602">
+                <a:tc>
+                  <a:txBody>
+                    <a:bodyPr/>
+                    <a:lstStyle/>
+                    <a:p>
+                      <a:pPr algn="ctr"/>
+                      <a:r>
+                        <a:rPr lang="en-GR" dirty="0"/>
+                        <a:t>Variables</a:t>
+                      </a:r>
+                    </a:p>
+                  </a:txBody>
+                  <a:tcPr/>
+                </a:tc>
+                <a:tc>
+                  <a:txBody>
+                    <a:bodyPr/>
+                    <a:lstStyle/>
+                    <a:p>
+                      <a:pPr algn="ctr"/>
+                      <a:r>
+                        <a:rPr lang="en-GR" dirty="0"/>
+                        <a:t>Selected Cut</a:t>
+                      </a:r>
+                    </a:p>
+                  </a:txBody>
+                  <a:tcPr/>
+                </a:tc>
+                <a:extLst>
+                  <a:ext uri="{0D108BD9-81ED-4DB2-BD59-A6C34878D82A}">
+                    <a16:rowId xmlns:a16="http://schemas.microsoft.com/office/drawing/2014/main" val="1233017762"/>
+                  </a:ext>
+                </a:extLst>
+              </a:tr>
+              <a:tr h="462602">
+                <a:tc>
+                  <a:txBody>
+                    <a:bodyPr/>
+                    <a:lstStyle/>
+                    <a:p>
+                      <a:pPr algn="ctr"/>
+                      <a:r>
+                        <a:rPr lang="en-GR" dirty="0"/>
+                        <a:t>pT (both leading jets) </a:t>
+                      </a:r>
+                    </a:p>
+                  </a:txBody>
+                  <a:tcPr/>
+                </a:tc>
+                <a:tc>
+                  <a:txBody>
+                    <a:bodyPr/>
+                    <a:lstStyle/>
+                    <a:p>
+                      <a:pPr algn="ctr"/>
+                      <a:r>
+                        <a:rPr lang="en-GR" dirty="0"/>
+                        <a:t>&gt; 400 GeV</a:t>
+                      </a:r>
+                    </a:p>
+                  </a:txBody>
+                  <a:tcPr/>
+                </a:tc>
+                <a:extLst>
+                  <a:ext uri="{0D108BD9-81ED-4DB2-BD59-A6C34878D82A}">
+                    <a16:rowId xmlns:a16="http://schemas.microsoft.com/office/drawing/2014/main" val="1455770781"/>
+                  </a:ext>
+                </a:extLst>
+              </a:tr>
+              <a:tr h="462602">
+                <a:tc>
+                  <a:txBody>
+                    <a:bodyPr/>
+                    <a:lstStyle/>
+                    <a:p>
+                      <a:pPr algn="ctr"/>
+                      <a:r>
+                        <a:rPr lang="en-GR" dirty="0"/>
+                        <a:t>Njets </a:t>
+                      </a:r>
+                    </a:p>
+                  </a:txBody>
+                  <a:tcPr/>
+                </a:tc>
+                <a:tc>
+                  <a:txBody>
+                    <a:bodyPr/>
+                    <a:lstStyle/>
+                    <a:p>
+                      <a:pPr algn="ctr"/>
+                      <a:r>
+                        <a:rPr lang="en-GR" dirty="0"/>
+                        <a:t>&gt; 1</a:t>
+                      </a:r>
+                    </a:p>
+                  </a:txBody>
+                  <a:tcPr/>
+                </a:tc>
+                <a:extLst>
+                  <a:ext uri="{0D108BD9-81ED-4DB2-BD59-A6C34878D82A}">
+                    <a16:rowId xmlns:a16="http://schemas.microsoft.com/office/drawing/2014/main" val="4073963215"/>
+                  </a:ext>
+                </a:extLst>
+              </a:tr>
+              <a:tr h="462602">
+                <a:tc>
+                  <a:txBody>
+                    <a:bodyPr/>
+                    <a:lstStyle/>
+                    <a:p>
+                      <a:pPr algn="ctr"/>
+                      <a:r>
+                        <a:rPr lang="en-GR" dirty="0"/>
+                        <a:t>N leptons</a:t>
+                      </a:r>
+                    </a:p>
+                  </a:txBody>
+                  <a:tcPr/>
+                </a:tc>
+                <a:tc>
+                  <a:txBody>
+                    <a:bodyPr/>
+                    <a:lstStyle/>
+                    <a:p>
+                      <a:pPr algn="ctr"/>
+                      <a:r>
+                        <a:rPr lang="en-GR" dirty="0"/>
+                        <a:t>= 0</a:t>
+                      </a:r>
+                    </a:p>
+                  </a:txBody>
+                  <a:tcPr/>
+                </a:tc>
+                <a:extLst>
+                  <a:ext uri="{0D108BD9-81ED-4DB2-BD59-A6C34878D82A}">
+                    <a16:rowId xmlns:a16="http://schemas.microsoft.com/office/drawing/2014/main" val="1636792577"/>
+                  </a:ext>
+                </a:extLst>
+              </a:tr>
+              <a:tr h="581727">
+                <a:tc>
+                  <a:txBody>
+                    <a:bodyPr/>
+                    <a:lstStyle/>
+                    <a:p>
+                      <a:pPr algn="ctr"/>
+                      <a:r>
+                        <a:rPr lang="en-GR" dirty="0"/>
+                        <a:t>|eta| (both leading jets)</a:t>
+                      </a:r>
+                    </a:p>
+                  </a:txBody>
+                  <a:tcPr/>
+                </a:tc>
+                <a:tc>
+                  <a:txBody>
+                    <a:bodyPr/>
+                    <a:lstStyle/>
+                    <a:p>
+                      <a:pPr algn="ctr"/>
+                      <a:r>
+                        <a:rPr lang="en-GR" dirty="0"/>
+                        <a:t>&lt; 2.4</a:t>
+                      </a:r>
+                    </a:p>
+                  </a:txBody>
+                  <a:tcPr/>
+                </a:tc>
+                <a:extLst>
+                  <a:ext uri="{0D108BD9-81ED-4DB2-BD59-A6C34878D82A}">
+                    <a16:rowId xmlns:a16="http://schemas.microsoft.com/office/drawing/2014/main" val="2646382854"/>
+                  </a:ext>
+                </a:extLst>
+              </a:tr>
+              <a:tr h="462602">
+                <a:tc>
+                  <a:txBody>
+                    <a:bodyPr/>
+                    <a:lstStyle/>
+                    <a:p>
+                      <a:pPr algn="ctr"/>
+                      <a:r>
+                        <a:rPr lang="en-GR" dirty="0"/>
+                        <a:t>mJJ</a:t>
+                      </a:r>
+                    </a:p>
+                  </a:txBody>
+                  <a:tcPr/>
+                </a:tc>
+                <a:tc>
+                  <a:txBody>
+                    <a:bodyPr/>
+                    <a:lstStyle/>
+                    <a:p>
+                      <a:pPr algn="ctr"/>
+                      <a:r>
+                        <a:rPr lang="en-GR" dirty="0"/>
+                        <a:t>&gt; 1000 GeV</a:t>
+                      </a:r>
+                    </a:p>
+                  </a:txBody>
+                  <a:tcPr/>
+                </a:tc>
+                <a:extLst>
+                  <a:ext uri="{0D108BD9-81ED-4DB2-BD59-A6C34878D82A}">
+                    <a16:rowId xmlns:a16="http://schemas.microsoft.com/office/drawing/2014/main" val="1717255047"/>
+                  </a:ext>
+                </a:extLst>
+              </a:tr>
+              <a:tr h="581727">
+                <a:tc>
+                  <a:txBody>
+                    <a:bodyPr/>
+                    <a:lstStyle/>
+                    <a:p>
+                      <a:pPr algn="ctr"/>
+                      <a:r>
+                        <a:rPr lang="en-GR" dirty="0"/>
+                        <a:t>jetMassSoftDrop (only for fit)</a:t>
+                      </a:r>
+                    </a:p>
+                  </a:txBody>
+                  <a:tcPr/>
+                </a:tc>
+                <a:tc>
+                  <a:txBody>
+                    <a:bodyPr/>
+                    <a:lstStyle/>
+                    <a:p>
+                      <a:pPr algn="ctr"/>
+                      <a:r>
+                        <a:rPr lang="en-GR" dirty="0"/>
+                        <a:t>(50,300) GeV</a:t>
+                      </a:r>
+                    </a:p>
+                  </a:txBody>
+                  <a:tcPr/>
+                </a:tc>
+                <a:extLst>
+                  <a:ext uri="{0D108BD9-81ED-4DB2-BD59-A6C34878D82A}">
+                    <a16:rowId xmlns:a16="http://schemas.microsoft.com/office/drawing/2014/main" val="4172697806"/>
+                  </a:ext>
+                </a:extLst>
+              </a:tr>
+              <a:tr h="581727">
+                <a:tc>
+                  <a:txBody>
+                    <a:bodyPr/>
+                    <a:lstStyle/>
+                    <a:p>
+                      <a:pPr marL="0" marR="0" lvl="0" indent="0" algn="ctr" defTabSz="914400" rtl="0" eaLnBrk="1" fontAlgn="auto" latinLnBrk="0" hangingPunct="1">
+                        <a:lnSpc>
+                          <a:spcPct val="100000"/>
+                        </a:lnSpc>
+                        <a:spcBef>
+                          <a:spcPts val="0"/>
+                        </a:spcBef>
+                        <a:spcAft>
+                          <a:spcPts val="0"/>
+                        </a:spcAft>
+                        <a:buClrTx/>
+                        <a:buSzTx/>
+                        <a:buFontTx/>
+                        <a:buNone/>
+                        <a:tabLst/>
+                        <a:defRPr/>
+                      </a:pPr>
+                      <a:r>
+                        <a:rPr lang="en-GB" dirty="0"/>
+                        <a:t>T</a:t>
+                      </a:r>
+                      <a:r>
+                        <a:rPr lang="en-GR" dirty="0"/>
+                        <a:t>op Tagger</a:t>
+                      </a:r>
+                    </a:p>
+                    <a:p>
+                      <a:pPr algn="ctr"/>
+                      <a:endParaRPr lang="en-GR" dirty="0"/>
+                    </a:p>
+                  </a:txBody>
+                  <a:tcPr/>
+                </a:tc>
+                <a:tc>
+                  <a:txBody>
+                    <a:bodyPr/>
+                    <a:lstStyle/>
+                    <a:p>
+                      <a:pPr algn="ctr"/>
+                      <a:r>
+                        <a:rPr lang="en-GR" dirty="0"/>
+                        <a:t>&gt; </a:t>
+                      </a:r>
+                      <a:r>
+                        <a:rPr lang="en-GR" dirty="0">
+                          <a:solidFill>
+                            <a:srgbClr val="00B0F0"/>
+                          </a:solidFill>
+                        </a:rPr>
+                        <a:t>0.2</a:t>
+                      </a:r>
+                      <a:r>
+                        <a:rPr lang="en-GR" dirty="0"/>
+                        <a:t>, </a:t>
+                      </a:r>
+                      <a:r>
+                        <a:rPr lang="en-GR" dirty="0">
+                          <a:solidFill>
+                            <a:srgbClr val="FF0000"/>
+                          </a:solidFill>
+                        </a:rPr>
+                        <a:t>0</a:t>
+                      </a:r>
+                      <a:r>
+                        <a:rPr lang="en-GR" dirty="0"/>
+                        <a:t>, </a:t>
+                      </a:r>
+                      <a:r>
+                        <a:rPr lang="en-GR" dirty="0">
+                          <a:solidFill>
+                            <a:srgbClr val="00B050"/>
+                          </a:solidFill>
+                        </a:rPr>
+                        <a:t>0.1</a:t>
+                      </a:r>
+                    </a:p>
+                  </a:txBody>
+                  <a:tcPr/>
+                </a:tc>
+                <a:extLst>
+                  <a:ext uri="{0D108BD9-81ED-4DB2-BD59-A6C34878D82A}">
+                    <a16:rowId xmlns:a16="http://schemas.microsoft.com/office/drawing/2014/main" val="1785673893"/>
+                  </a:ext>
+                </a:extLst>
+              </a:tr>
+              <a:tr h="581727">
+                <a:tc>
+                  <a:txBody>
+                    <a:bodyPr/>
+                    <a:lstStyle/>
+                    <a:p>
+                      <a:pPr algn="ctr"/>
+                      <a:r>
+                        <a:rPr lang="en-GR" dirty="0"/>
+                        <a:t>B tagging (2 btagged jets)</a:t>
+                      </a:r>
+                    </a:p>
+                  </a:txBody>
+                  <a:tcPr/>
+                </a:tc>
+                <a:tc>
+                  <a:txBody>
+                    <a:bodyPr/>
+                    <a:lstStyle/>
+                    <a:p>
+                      <a:pPr algn="ctr"/>
+                      <a:r>
+                        <a:rPr lang="en-GR" dirty="0"/>
+                        <a:t>&gt; </a:t>
+                      </a:r>
+                      <a:r>
+                        <a:rPr lang="en-GR" dirty="0">
+                          <a:solidFill>
+                            <a:srgbClr val="FF0000"/>
+                          </a:solidFill>
+                        </a:rPr>
+                        <a:t>Medium</a:t>
+                      </a:r>
+                      <a:r>
+                        <a:rPr lang="en-GR" dirty="0"/>
+                        <a:t> WP</a:t>
+                      </a:r>
+                    </a:p>
+                  </a:txBody>
+                  <a:tcPr/>
+                </a:tc>
+                <a:extLst>
+                  <a:ext uri="{0D108BD9-81ED-4DB2-BD59-A6C34878D82A}">
+                    <a16:rowId xmlns:a16="http://schemas.microsoft.com/office/drawing/2014/main" val="770137147"/>
+                  </a:ext>
+                </a:extLst>
+              </a:tr>
+              <a:tr h="581727">
+                <a:tc>
+                  <a:txBody>
+                    <a:bodyPr/>
+                    <a:lstStyle/>
+                    <a:p>
+                      <a:pPr algn="ctr"/>
+                      <a:r>
+                        <a:rPr lang="en-GR" dirty="0"/>
+                        <a:t>Signal Trigger</a:t>
+                      </a:r>
+                    </a:p>
+                  </a:txBody>
+                  <a:tcPr/>
+                </a:tc>
+                <a:tc>
+                  <a:txBody>
+                    <a:bodyPr/>
+                    <a:lstStyle/>
+                    <a:p>
+                      <a:pPr algn="ctr"/>
+                      <a:endParaRPr lang="en-GR" dirty="0"/>
+                    </a:p>
+                  </a:txBody>
+                  <a:tcPr/>
+                </a:tc>
+                <a:extLst>
+                  <a:ext uri="{0D108BD9-81ED-4DB2-BD59-A6C34878D82A}">
+                    <a16:rowId xmlns:a16="http://schemas.microsoft.com/office/drawing/2014/main" val="2405045937"/>
+                  </a:ext>
+                </a:extLst>
+              </a:tr>
+            </a:tbl>
+          </a:graphicData>
+        </a:graphic>
+      </p:graphicFrame>
+      <p:graphicFrame>
+        <p:nvGraphicFramePr>
+          <p:cNvPr id="10" name="Table 9">
+            <a:extLst>
+              <a:ext uri="{FF2B5EF4-FFF2-40B4-BE49-F238E27FC236}">
+                <a16:creationId xmlns:a16="http://schemas.microsoft.com/office/drawing/2014/main" id="{DAB3EDC7-2C81-A141-8F2F-14CEB014A448}"/>
+              </a:ext>
+            </a:extLst>
+          </p:cNvPr>
+          <p:cNvGraphicFramePr>
+            <a:graphicFrameLocks noGrp="1"/>
+          </p:cNvGraphicFramePr>
+          <p:nvPr/>
+        </p:nvGraphicFramePr>
+        <p:xfrm>
+          <a:off x="6844365" y="557852"/>
+          <a:ext cx="4368118" cy="5498871"/>
+        </p:xfrm>
+        <a:graphic>
+          <a:graphicData uri="http://schemas.openxmlformats.org/drawingml/2006/table">
+            <a:tbl>
+              <a:tblPr firstRow="1" bandRow="1">
+                <a:tableStyleId>{0660B408-B3CF-4A94-85FC-2B1E0A45F4A2}</a:tableStyleId>
+              </a:tblPr>
+              <a:tblGrid>
+                <a:gridCol w="2184059">
+                  <a:extLst>
+                    <a:ext uri="{9D8B030D-6E8A-4147-A177-3AD203B41FA5}">
+                      <a16:colId xmlns:a16="http://schemas.microsoft.com/office/drawing/2014/main" val="3731337435"/>
+                    </a:ext>
+                  </a:extLst>
+                </a:gridCol>
+                <a:gridCol w="2184059">
+                  <a:extLst>
+                    <a:ext uri="{9D8B030D-6E8A-4147-A177-3AD203B41FA5}">
+                      <a16:colId xmlns:a16="http://schemas.microsoft.com/office/drawing/2014/main" val="3688698510"/>
+                    </a:ext>
+                  </a:extLst>
+                </a:gridCol>
+              </a:tblGrid>
+              <a:tr h="430967">
+                <a:tc>
+                  <a:txBody>
+                    <a:bodyPr/>
+                    <a:lstStyle/>
+                    <a:p>
+                      <a:pPr algn="ctr"/>
+                      <a:r>
+                        <a:rPr lang="en-GR" dirty="0"/>
+                        <a:t>Variables</a:t>
+                      </a:r>
+                    </a:p>
+                  </a:txBody>
+                  <a:tcPr/>
+                </a:tc>
+                <a:tc>
+                  <a:txBody>
+                    <a:bodyPr/>
+                    <a:lstStyle/>
+                    <a:p>
+                      <a:pPr algn="ctr"/>
+                      <a:r>
+                        <a:rPr lang="en-GR" dirty="0"/>
+                        <a:t>Selected Cut</a:t>
+                      </a:r>
+                    </a:p>
+                  </a:txBody>
+                  <a:tcPr/>
+                </a:tc>
+                <a:extLst>
+                  <a:ext uri="{0D108BD9-81ED-4DB2-BD59-A6C34878D82A}">
+                    <a16:rowId xmlns:a16="http://schemas.microsoft.com/office/drawing/2014/main" val="1233017762"/>
+                  </a:ext>
+                </a:extLst>
+              </a:tr>
+              <a:tr h="494428">
+                <a:tc>
+                  <a:txBody>
+                    <a:bodyPr/>
+                    <a:lstStyle/>
+                    <a:p>
+                      <a:pPr algn="ctr"/>
+                      <a:r>
+                        <a:rPr lang="en-GR" dirty="0"/>
+                        <a:t>pT (both leading jets) </a:t>
+                      </a:r>
+                    </a:p>
+                  </a:txBody>
+                  <a:tcPr/>
+                </a:tc>
+                <a:tc>
+                  <a:txBody>
+                    <a:bodyPr/>
+                    <a:lstStyle/>
+                    <a:p>
+                      <a:pPr algn="ctr"/>
+                      <a:r>
+                        <a:rPr lang="en-GR" dirty="0"/>
+                        <a:t>&gt; 400 GeV</a:t>
+                      </a:r>
+                    </a:p>
+                  </a:txBody>
+                  <a:tcPr/>
+                </a:tc>
+                <a:extLst>
+                  <a:ext uri="{0D108BD9-81ED-4DB2-BD59-A6C34878D82A}">
+                    <a16:rowId xmlns:a16="http://schemas.microsoft.com/office/drawing/2014/main" val="1455770781"/>
+                  </a:ext>
+                </a:extLst>
+              </a:tr>
+              <a:tr h="430967">
+                <a:tc>
+                  <a:txBody>
+                    <a:bodyPr/>
+                    <a:lstStyle/>
+                    <a:p>
+                      <a:pPr algn="ctr"/>
+                      <a:r>
+                        <a:rPr lang="en-GR" dirty="0"/>
+                        <a:t>Njets </a:t>
+                      </a:r>
+                    </a:p>
+                  </a:txBody>
+                  <a:tcPr/>
+                </a:tc>
+                <a:tc>
+                  <a:txBody>
+                    <a:bodyPr/>
+                    <a:lstStyle/>
+                    <a:p>
+                      <a:pPr algn="ctr"/>
+                      <a:r>
+                        <a:rPr lang="en-GR" dirty="0"/>
+                        <a:t>&gt; 1</a:t>
+                      </a:r>
+                    </a:p>
+                  </a:txBody>
+                  <a:tcPr/>
+                </a:tc>
+                <a:extLst>
+                  <a:ext uri="{0D108BD9-81ED-4DB2-BD59-A6C34878D82A}">
+                    <a16:rowId xmlns:a16="http://schemas.microsoft.com/office/drawing/2014/main" val="3320086472"/>
+                  </a:ext>
+                </a:extLst>
+              </a:tr>
+              <a:tr h="605786">
+                <a:tc>
+                  <a:txBody>
+                    <a:bodyPr/>
+                    <a:lstStyle/>
+                    <a:p>
+                      <a:pPr marL="0" marR="0" lvl="0" indent="0" algn="ctr" defTabSz="914400" rtl="0" eaLnBrk="1" fontAlgn="auto" latinLnBrk="0" hangingPunct="1">
+                        <a:lnSpc>
+                          <a:spcPct val="100000"/>
+                        </a:lnSpc>
+                        <a:spcBef>
+                          <a:spcPts val="0"/>
+                        </a:spcBef>
+                        <a:spcAft>
+                          <a:spcPts val="0"/>
+                        </a:spcAft>
+                        <a:buClrTx/>
+                        <a:buSzTx/>
+                        <a:buFontTx/>
+                        <a:buNone/>
+                        <a:tabLst/>
+                        <a:defRPr/>
+                      </a:pPr>
+                      <a:r>
+                        <a:rPr lang="en-GR" dirty="0"/>
+                        <a:t>N leptons</a:t>
+                      </a:r>
+                    </a:p>
+                  </a:txBody>
+                  <a:tcPr/>
+                </a:tc>
+                <a:tc>
+                  <a:txBody>
+                    <a:bodyPr/>
+                    <a:lstStyle/>
+                    <a:p>
+                      <a:pPr algn="ctr"/>
+                      <a:r>
+                        <a:rPr lang="en-GR" dirty="0"/>
+                        <a:t>= 0</a:t>
+                      </a:r>
+                    </a:p>
+                  </a:txBody>
+                  <a:tcPr/>
+                </a:tc>
+                <a:extLst>
+                  <a:ext uri="{0D108BD9-81ED-4DB2-BD59-A6C34878D82A}">
+                    <a16:rowId xmlns:a16="http://schemas.microsoft.com/office/drawing/2014/main" val="1978738799"/>
+                  </a:ext>
+                </a:extLst>
+              </a:tr>
+              <a:tr h="629126">
+                <a:tc>
+                  <a:txBody>
+                    <a:bodyPr/>
+                    <a:lstStyle/>
+                    <a:p>
+                      <a:pPr algn="ctr"/>
+                      <a:r>
+                        <a:rPr lang="en-GR" dirty="0"/>
+                        <a:t>|eta| (both leading jets)</a:t>
+                      </a:r>
+                    </a:p>
+                  </a:txBody>
+                  <a:tcPr/>
+                </a:tc>
+                <a:tc>
+                  <a:txBody>
+                    <a:bodyPr/>
+                    <a:lstStyle/>
+                    <a:p>
+                      <a:pPr algn="ctr"/>
+                      <a:r>
+                        <a:rPr lang="en-GR" dirty="0"/>
+                        <a:t>&lt; 2.4</a:t>
+                      </a:r>
+                    </a:p>
+                  </a:txBody>
+                  <a:tcPr/>
+                </a:tc>
+                <a:extLst>
+                  <a:ext uri="{0D108BD9-81ED-4DB2-BD59-A6C34878D82A}">
+                    <a16:rowId xmlns:a16="http://schemas.microsoft.com/office/drawing/2014/main" val="2646382854"/>
+                  </a:ext>
+                </a:extLst>
+              </a:tr>
+              <a:tr h="430967">
+                <a:tc>
+                  <a:txBody>
+                    <a:bodyPr/>
+                    <a:lstStyle/>
+                    <a:p>
+                      <a:pPr algn="ctr"/>
+                      <a:r>
+                        <a:rPr lang="en-GR" dirty="0"/>
+                        <a:t>mJJ</a:t>
+                      </a:r>
+                    </a:p>
+                  </a:txBody>
+                  <a:tcPr/>
+                </a:tc>
+                <a:tc>
+                  <a:txBody>
+                    <a:bodyPr/>
+                    <a:lstStyle/>
+                    <a:p>
+                      <a:pPr algn="ctr"/>
+                      <a:r>
+                        <a:rPr lang="en-GR" dirty="0"/>
+                        <a:t>&gt; 1000 GeV</a:t>
+                      </a:r>
+                    </a:p>
+                  </a:txBody>
+                  <a:tcPr/>
+                </a:tc>
+                <a:extLst>
+                  <a:ext uri="{0D108BD9-81ED-4DB2-BD59-A6C34878D82A}">
+                    <a16:rowId xmlns:a16="http://schemas.microsoft.com/office/drawing/2014/main" val="1717255047"/>
+                  </a:ext>
+                </a:extLst>
+              </a:tr>
+              <a:tr h="629126">
+                <a:tc>
+                  <a:txBody>
+                    <a:bodyPr/>
+                    <a:lstStyle/>
+                    <a:p>
+                      <a:pPr algn="ctr"/>
+                      <a:r>
+                        <a:rPr lang="en-GR" dirty="0"/>
+                        <a:t>jetMassSoftDrop (only for fit)</a:t>
+                      </a:r>
+                    </a:p>
+                  </a:txBody>
+                  <a:tcPr/>
+                </a:tc>
+                <a:tc>
+                  <a:txBody>
+                    <a:bodyPr/>
+                    <a:lstStyle/>
+                    <a:p>
+                      <a:pPr algn="ctr"/>
+                      <a:r>
+                        <a:rPr lang="en-GR" dirty="0"/>
+                        <a:t>(50,300) GeV</a:t>
+                      </a:r>
+                    </a:p>
+                  </a:txBody>
+                  <a:tcPr/>
+                </a:tc>
+                <a:extLst>
+                  <a:ext uri="{0D108BD9-81ED-4DB2-BD59-A6C34878D82A}">
+                    <a16:rowId xmlns:a16="http://schemas.microsoft.com/office/drawing/2014/main" val="4172697806"/>
+                  </a:ext>
+                </a:extLst>
+              </a:tr>
+              <a:tr h="629126">
+                <a:tc>
+                  <a:txBody>
+                    <a:bodyPr/>
+                    <a:lstStyle/>
+                    <a:p>
+                      <a:pPr marL="0" marR="0" lvl="0" indent="0" algn="ctr" defTabSz="914400" rtl="0" eaLnBrk="1" fontAlgn="auto" latinLnBrk="0" hangingPunct="1">
+                        <a:lnSpc>
+                          <a:spcPct val="100000"/>
+                        </a:lnSpc>
+                        <a:spcBef>
+                          <a:spcPts val="0"/>
+                        </a:spcBef>
+                        <a:spcAft>
+                          <a:spcPts val="0"/>
+                        </a:spcAft>
+                        <a:buClrTx/>
+                        <a:buSzTx/>
+                        <a:buFontTx/>
+                        <a:buNone/>
+                        <a:tabLst/>
+                        <a:defRPr/>
+                      </a:pPr>
+                      <a:r>
+                        <a:rPr lang="en-GB" dirty="0"/>
+                        <a:t>T</a:t>
+                      </a:r>
+                      <a:r>
+                        <a:rPr lang="en-GR" dirty="0"/>
+                        <a:t>op Tagger</a:t>
+                      </a:r>
+                    </a:p>
+                    <a:p>
+                      <a:pPr algn="ctr"/>
+                      <a:endParaRPr lang="en-GR" dirty="0"/>
+                    </a:p>
+                  </a:txBody>
+                  <a:tcPr/>
+                </a:tc>
+                <a:tc>
+                  <a:txBody>
+                    <a:bodyPr/>
+                    <a:lstStyle/>
+                    <a:p>
+                      <a:pPr marL="0" marR="0" lvl="0" indent="0" algn="ctr" defTabSz="914400" rtl="0" eaLnBrk="1" fontAlgn="auto" latinLnBrk="0" hangingPunct="1">
+                        <a:lnSpc>
+                          <a:spcPct val="100000"/>
+                        </a:lnSpc>
+                        <a:spcBef>
+                          <a:spcPts val="0"/>
+                        </a:spcBef>
+                        <a:spcAft>
+                          <a:spcPts val="0"/>
+                        </a:spcAft>
+                        <a:buClrTx/>
+                        <a:buSzTx/>
+                        <a:buFontTx/>
+                        <a:buNone/>
+                        <a:tabLst/>
+                        <a:defRPr/>
+                      </a:pPr>
+                      <a:r>
+                        <a:rPr lang="en-GR" dirty="0"/>
+                        <a:t>&gt; </a:t>
+                      </a:r>
+                      <a:r>
+                        <a:rPr lang="en-GR" dirty="0">
+                          <a:solidFill>
+                            <a:srgbClr val="00B0F0"/>
+                          </a:solidFill>
+                        </a:rPr>
+                        <a:t>0.2</a:t>
+                      </a:r>
+                      <a:r>
+                        <a:rPr lang="en-GR" dirty="0"/>
+                        <a:t>, </a:t>
+                      </a:r>
+                      <a:r>
+                        <a:rPr lang="en-GR" dirty="0">
+                          <a:solidFill>
+                            <a:srgbClr val="FF0000"/>
+                          </a:solidFill>
+                        </a:rPr>
+                        <a:t>0</a:t>
+                      </a:r>
+                      <a:r>
+                        <a:rPr lang="en-GR" dirty="0"/>
+                        <a:t>, </a:t>
+                      </a:r>
+                      <a:r>
+                        <a:rPr lang="en-GR" dirty="0">
+                          <a:solidFill>
+                            <a:srgbClr val="00B050"/>
+                          </a:solidFill>
+                        </a:rPr>
+                        <a:t>0.1</a:t>
+                      </a:r>
+                    </a:p>
+                    <a:p>
+                      <a:pPr algn="ctr"/>
+                      <a:endParaRPr lang="en-GR" dirty="0"/>
+                    </a:p>
+                  </a:txBody>
+                  <a:tcPr/>
+                </a:tc>
+                <a:extLst>
+                  <a:ext uri="{0D108BD9-81ED-4DB2-BD59-A6C34878D82A}">
+                    <a16:rowId xmlns:a16="http://schemas.microsoft.com/office/drawing/2014/main" val="1785673893"/>
+                  </a:ext>
+                </a:extLst>
+              </a:tr>
+              <a:tr h="629126">
+                <a:tc>
+                  <a:txBody>
+                    <a:bodyPr/>
+                    <a:lstStyle/>
+                    <a:p>
+                      <a:pPr algn="ctr"/>
+                      <a:r>
+                        <a:rPr lang="en-GR" dirty="0"/>
+                        <a:t>B tagging (0 btagged jets)</a:t>
+                      </a:r>
+                    </a:p>
+                  </a:txBody>
+                  <a:tcPr/>
+                </a:tc>
+                <a:tc>
+                  <a:txBody>
+                    <a:bodyPr/>
+                    <a:lstStyle/>
+                    <a:p>
+                      <a:pPr algn="ctr"/>
+                      <a:r>
+                        <a:rPr lang="en-GR" dirty="0"/>
+                        <a:t>&lt; </a:t>
+                      </a:r>
+                      <a:r>
+                        <a:rPr lang="en-GR" dirty="0">
+                          <a:solidFill>
+                            <a:srgbClr val="FF0000"/>
+                          </a:solidFill>
+                        </a:rPr>
+                        <a:t>Medium</a:t>
+                      </a:r>
+                      <a:r>
+                        <a:rPr lang="en-GR" dirty="0"/>
+                        <a:t> WP</a:t>
+                      </a:r>
+                    </a:p>
+                  </a:txBody>
+                  <a:tcPr/>
+                </a:tc>
+                <a:extLst>
+                  <a:ext uri="{0D108BD9-81ED-4DB2-BD59-A6C34878D82A}">
+                    <a16:rowId xmlns:a16="http://schemas.microsoft.com/office/drawing/2014/main" val="770137147"/>
+                  </a:ext>
+                </a:extLst>
+              </a:tr>
+              <a:tr h="545436">
+                <a:tc>
+                  <a:txBody>
+                    <a:bodyPr/>
+                    <a:lstStyle/>
+                    <a:p>
+                      <a:pPr algn="ctr"/>
+                      <a:r>
+                        <a:rPr lang="en-GR" dirty="0"/>
+                        <a:t>Control Trigger</a:t>
+                      </a:r>
+                    </a:p>
+                  </a:txBody>
+                  <a:tcPr/>
+                </a:tc>
+                <a:tc>
+                  <a:txBody>
+                    <a:bodyPr/>
+                    <a:lstStyle/>
+                    <a:p>
+                      <a:pPr algn="ctr"/>
+                      <a:endParaRPr lang="en-GR" dirty="0"/>
+                    </a:p>
+                  </a:txBody>
+                  <a:tcPr/>
+                </a:tc>
+                <a:extLst>
+                  <a:ext uri="{0D108BD9-81ED-4DB2-BD59-A6C34878D82A}">
+                    <a16:rowId xmlns:a16="http://schemas.microsoft.com/office/drawing/2014/main" val="1181864082"/>
+                  </a:ext>
+                </a:extLst>
+              </a:tr>
+            </a:tbl>
+          </a:graphicData>
+        </a:graphic>
+      </p:graphicFrame>
+      <p:sp>
+        <p:nvSpPr>
+          <p:cNvPr id="11" name="TextBox 10">
+            <a:extLst>
+              <a:ext uri="{FF2B5EF4-FFF2-40B4-BE49-F238E27FC236}">
+                <a16:creationId xmlns:a16="http://schemas.microsoft.com/office/drawing/2014/main" id="{9E9DDF71-90B0-C245-8A52-0A505D755F00}"/>
+              </a:ext>
+            </a:extLst>
+          </p:cNvPr>
+          <p:cNvSpPr txBox="1"/>
+          <p:nvPr/>
+        </p:nvSpPr>
+        <p:spPr>
+          <a:xfrm>
+            <a:off x="7423707" y="65430"/>
+            <a:ext cx="3291946" cy="430887"/>
+          </a:xfrm>
+          <a:prstGeom prst="rect">
+            <a:avLst/>
+          </a:prstGeom>
+          <a:noFill/>
+        </p:spPr>
+        <p:txBody>
+          <a:bodyPr wrap="square" rtlCol="0">
+            <a:spAutoFit/>
+          </a:bodyPr>
+          <a:lstStyle/>
+          <a:p>
+            <a:r>
+              <a:rPr lang="en-US" sz="2200" dirty="0">
+                <a:solidFill>
+                  <a:srgbClr val="FF0000"/>
+                </a:solidFill>
+                <a:sym typeface="Wingdings" pitchFamily="2" charset="2"/>
+              </a:rPr>
+              <a:t>Control Region Selection</a:t>
+            </a:r>
+          </a:p>
+        </p:txBody>
+      </p:sp>
+    </p:spTree>
+    <p:extLst>
+      <p:ext uri="{BB962C8B-B14F-4D97-AF65-F5344CB8AC3E}">
+        <p14:creationId xmlns:p14="http://schemas.microsoft.com/office/powerpoint/2010/main" val="814623943"/>
+      </p:ext>
+    </p:extLst>
+  </p:cSld>
+  <p:clrMapOvr>
+    <a:masterClrMapping/>
+  </p:clrMapOvr>
+</p:sld>
+</file>
+
+<file path=ppt/slides/slide13.xml><?xml version="1.0" encoding="utf-8"?>
+<p:sld xmlns:a="http://schemas.openxmlformats.org/drawingml/2006/main" xmlns:r="http://schemas.openxmlformats.org/officeDocument/2006/relationships" xmlns:p="http://schemas.openxmlformats.org/presentationml/2006/main">
+  <p:cSld>
+    <p:spTree>
+      <p:nvGrpSpPr>
+        <p:cNvPr id="1" name=""/>
+        <p:cNvGrpSpPr/>
+        <p:nvPr/>
+      </p:nvGrpSpPr>
+      <p:grpSpPr>
+        <a:xfrm>
+          <a:off x="0" y="0"/>
+          <a:ext cx="0" cy="0"/>
+          <a:chOff x="0" y="0"/>
+          <a:chExt cx="0" cy="0"/>
+        </a:xfrm>
+      </p:grpSpPr>
+      <p:sp>
+        <p:nvSpPr>
+          <p:cNvPr id="11" name="Footer Placeholder 7">
+            <a:extLst>
+              <a:ext uri="{FF2B5EF4-FFF2-40B4-BE49-F238E27FC236}">
+                <a16:creationId xmlns:a16="http://schemas.microsoft.com/office/drawing/2014/main" id="{59E26047-BD3C-504E-B955-20FE5C8AA1AA}"/>
+              </a:ext>
+            </a:extLst>
+          </p:cNvPr>
+          <p:cNvSpPr>
+            <a:spLocks noGrp="1"/>
+          </p:cNvSpPr>
+          <p:nvPr>
+            <p:ph type="ftr" sz="quarter" idx="11"/>
+          </p:nvPr>
+        </p:nvSpPr>
+        <p:spPr>
+          <a:xfrm>
+            <a:off x="3686185" y="6459785"/>
+            <a:ext cx="4822804" cy="365125"/>
+          </a:xfrm>
+        </p:spPr>
+        <p:txBody>
+          <a:bodyPr/>
+          <a:lstStyle/>
+          <a:p>
+            <a:r>
+              <a:rPr lang="fi-FI" dirty="0"/>
+              <a:t>NTUA G. </a:t>
+            </a:r>
+            <a:r>
+              <a:rPr lang="fi-FI" dirty="0" err="1"/>
+              <a:t>Bakas</a:t>
+            </a:r>
+            <a:endParaRPr lang="en-US" dirty="0"/>
+          </a:p>
+        </p:txBody>
+      </p:sp>
+      <p:sp>
+        <p:nvSpPr>
+          <p:cNvPr id="12" name="Title 4">
+            <a:extLst>
+              <a:ext uri="{FF2B5EF4-FFF2-40B4-BE49-F238E27FC236}">
+                <a16:creationId xmlns:a16="http://schemas.microsoft.com/office/drawing/2014/main" id="{CCE472BB-DFA4-B349-8F30-2673C528FF7C}"/>
+              </a:ext>
+            </a:extLst>
+          </p:cNvPr>
+          <p:cNvSpPr txBox="1">
+            <a:spLocks/>
+          </p:cNvSpPr>
+          <p:nvPr/>
+        </p:nvSpPr>
+        <p:spPr>
+          <a:xfrm>
+            <a:off x="182879" y="115590"/>
+            <a:ext cx="10520413" cy="600982"/>
+          </a:xfrm>
+          <a:prstGeom prst="rect">
+            <a:avLst/>
+          </a:prstGeom>
+        </p:spPr>
+        <p:txBody>
+          <a:bodyPr vert="horz" lIns="91440" tIns="45720" rIns="91440" bIns="45720" rtlCol="0" anchor="b">
+            <a:noAutofit/>
+          </a:bodyPr>
+          <a:lstStyle>
+            <a:lvl1pPr algn="l" defTabSz="914400" rtl="0" eaLnBrk="1" latinLnBrk="0" hangingPunct="1">
+              <a:lnSpc>
+                <a:spcPct val="85000"/>
+              </a:lnSpc>
+              <a:spcBef>
+                <a:spcPct val="0"/>
+              </a:spcBef>
+              <a:buNone/>
+              <a:defRPr sz="4800" kern="1200" spc="-50" baseline="0">
+                <a:solidFill>
+                  <a:schemeClr val="tx1">
+                    <a:lumMod val="75000"/>
+                    <a:lumOff val="25000"/>
+                  </a:schemeClr>
+                </a:solidFill>
+                <a:latin typeface="+mj-lt"/>
+                <a:ea typeface="+mj-ea"/>
+                <a:cs typeface="+mj-cs"/>
+              </a:defRPr>
+            </a:lvl1pPr>
+          </a:lstStyle>
+          <a:p>
+            <a:r>
+              <a:rPr lang="en-GB" sz="3600" u="sng" dirty="0"/>
+              <a:t>Top Angular Distributions</a:t>
+            </a:r>
+          </a:p>
+        </p:txBody>
+      </p:sp>
+      <p:sp>
+        <p:nvSpPr>
+          <p:cNvPr id="2" name="Slide Number Placeholder 1">
+            <a:extLst>
+              <a:ext uri="{FF2B5EF4-FFF2-40B4-BE49-F238E27FC236}">
+                <a16:creationId xmlns:a16="http://schemas.microsoft.com/office/drawing/2014/main" id="{AA422B14-CFD2-DA45-ABB4-F85273D6A99E}"/>
+              </a:ext>
+            </a:extLst>
+          </p:cNvPr>
+          <p:cNvSpPr>
+            <a:spLocks noGrp="1"/>
+          </p:cNvSpPr>
+          <p:nvPr>
+            <p:ph type="sldNum" sz="quarter" idx="12"/>
+          </p:nvPr>
+        </p:nvSpPr>
+        <p:spPr/>
+        <p:txBody>
+          <a:bodyPr/>
+          <a:lstStyle/>
+          <a:p>
+            <a:fld id="{4FAB73BC-B049-4115-A692-8D63A059BFB8}" type="slidenum">
+              <a:rPr lang="en-US" smtClean="0"/>
+              <a:pPr/>
+              <a:t>13</a:t>
             </a:fld>
             <a:endParaRPr lang="en-US" dirty="0"/>
           </a:p>
@@ -8764,7 +10339,7 @@
         </p:nvSpPr>
         <p:spPr>
           <a:xfrm>
-            <a:off x="182879" y="115590"/>
+            <a:off x="182879" y="0"/>
             <a:ext cx="10520413" cy="600982"/>
           </a:xfrm>
           <a:prstGeom prst="rect">
@@ -8849,8 +10424,8 @@
         </p:nvSpPr>
         <p:spPr>
           <a:xfrm>
-            <a:off x="182879" y="772054"/>
-            <a:ext cx="11610109" cy="5262979"/>
+            <a:off x="182879" y="600982"/>
+            <a:ext cx="11610109" cy="6001643"/>
           </a:xfrm>
           <a:prstGeom prst="rect">
             <a:avLst/>
@@ -8863,73 +10438,55 @@
           </a:bodyPr>
           <a:lstStyle/>
           <a:p>
-            <a:pPr marL="285750" indent="-285750">
+            <a:pPr marL="342900" indent="-342900">
               <a:buFont typeface="Arial" panose="020B0604020202020204" pitchFamily="34" charset="0"/>
               <a:buChar char="•"/>
             </a:pPr>
             <a:r>
-              <a:rPr lang="en-US" sz="2400" dirty="0"/>
-              <a:t>Start investigating ttbar Systematic Uncertainties</a:t>
-            </a:r>
-          </a:p>
-          <a:p>
-            <a:endParaRPr lang="en-US" sz="2400" dirty="0"/>
-          </a:p>
-          <a:p>
-            <a:pPr marL="285750" indent="-285750">
+              <a:rPr lang="en-US" sz="2400" dirty="0">
+                <a:sym typeface="Wingdings" pitchFamily="2" charset="2"/>
+              </a:rPr>
+              <a:t>New Signal Region:</a:t>
+            </a:r>
+          </a:p>
+          <a:p>
+            <a:pPr marL="800100" lvl="1" indent="-342900">
               <a:buFont typeface="Arial" panose="020B0604020202020204" pitchFamily="34" charset="0"/>
               <a:buChar char="•"/>
             </a:pPr>
             <a:r>
-              <a:rPr lang="en-US" sz="2400" dirty="0"/>
-              <a:t>Top Angular Distributions: chi, |cos</a:t>
-            </a:r>
-            <a:r>
-              <a:rPr lang="el-GR" sz="2400" dirty="0"/>
-              <a:t>θ*|</a:t>
-            </a:r>
-            <a:r>
-              <a:rPr lang="en-US" sz="2400" dirty="0"/>
-              <a:t> leading and </a:t>
-            </a:r>
-            <a:r>
-              <a:rPr lang="en-US" sz="2400" dirty="0" err="1"/>
-              <a:t>subleading</a:t>
-            </a:r>
-            <a:r>
-              <a:rPr lang="en-US" sz="2400" dirty="0"/>
-              <a:t> </a:t>
-            </a:r>
-            <a:endParaRPr lang="en-US" sz="2400" dirty="0">
-              <a:sym typeface="Wingdings" pitchFamily="2" charset="2"/>
-            </a:endParaRPr>
-          </a:p>
-          <a:p>
-            <a:pPr marL="742950" lvl="1" indent="-285750">
-              <a:buFont typeface="Arial" panose="020B0604020202020204" pitchFamily="34" charset="0"/>
-              <a:buChar char="•"/>
-            </a:pPr>
-            <a:r>
               <a:rPr lang="en-US" sz="2400" dirty="0">
                 <a:sym typeface="Wingdings" pitchFamily="2" charset="2"/>
               </a:rPr>
-              <a:t>Changed binning for the cos(</a:t>
-            </a:r>
-            <a:r>
-              <a:rPr lang="el-GR" sz="2400" dirty="0">
+              <a:t>SR</a:t>
+            </a:r>
+            <a:r>
+              <a:rPr lang="en-US" sz="2400" baseline="-25000" dirty="0">
                 <a:sym typeface="Wingdings" pitchFamily="2" charset="2"/>
               </a:rPr>
-              <a:t>θ*)</a:t>
+              <a:t>C </a:t>
             </a:r>
             <a:r>
               <a:rPr lang="en-US" sz="2400" dirty="0">
                 <a:sym typeface="Wingdings" pitchFamily="2" charset="2"/>
               </a:rPr>
-              <a:t> distributions</a:t>
-            </a:r>
-          </a:p>
-          <a:p>
-            <a:pPr marL="742950" lvl="1" indent="-285750">
+              <a:t>= SR + </a:t>
+            </a:r>
+            <a:r>
+              <a:rPr lang="en-US" sz="2400" dirty="0" err="1">
+                <a:sym typeface="Wingdings" pitchFamily="2" charset="2"/>
+              </a:rPr>
+              <a:t>mJJ</a:t>
+            </a:r>
+            <a:r>
+              <a:rPr lang="en-US" sz="2400" dirty="0">
+                <a:sym typeface="Wingdings" pitchFamily="2" charset="2"/>
+              </a:rPr>
+              <a:t> &gt; 1.5TeV</a:t>
+            </a:r>
+          </a:p>
+          <a:p>
+            <a:pPr marL="800100" lvl="1" indent="-342900">
               <a:buFont typeface="Arial" panose="020B0604020202020204" pitchFamily="34" charset="0"/>
               <a:buChar char="•"/>
             </a:pPr>
@@ -8938,7 +10495,7 @@
             </a:endParaRPr>
           </a:p>
           <a:p>
-            <a:pPr marL="285750" indent="-285750">
+            <a:pPr marL="342900" indent="-342900">
               <a:buFont typeface="Arial" panose="020B0604020202020204" pitchFamily="34" charset="0"/>
               <a:buChar char="•"/>
             </a:pPr>
@@ -8946,11 +10503,11 @@
               <a:rPr lang="en-US" sz="2400" dirty="0">
                 <a:sym typeface="Wingdings" pitchFamily="2" charset="2"/>
               </a:rPr>
-              <a:t>Z’ analysis:</a:t>
-            </a:r>
-          </a:p>
-          <a:p>
-            <a:pPr marL="742950" lvl="1" indent="-285750">
+              <a:t>Contamination</a:t>
+            </a:r>
+          </a:p>
+          <a:p>
+            <a:pPr marL="342900" indent="-342900">
               <a:buFont typeface="Arial" panose="020B0604020202020204" pitchFamily="34" charset="0"/>
               <a:buChar char="•"/>
             </a:pPr>
@@ -8958,119 +10515,71 @@
               <a:rPr lang="en-US" sz="2400" dirty="0">
                 <a:sym typeface="Wingdings" pitchFamily="2" charset="2"/>
               </a:rPr>
-              <a:t>Goal is to plot the ttbar mc samples and Z’ </a:t>
+              <a:t>Closure tests (</a:t>
             </a:r>
             <a:r>
               <a:rPr lang="en-US" sz="2400" dirty="0" err="1">
                 <a:sym typeface="Wingdings" pitchFamily="2" charset="2"/>
               </a:rPr>
-              <a:t>mc’s</a:t>
+              <a:t>qcd</a:t>
             </a:r>
             <a:r>
               <a:rPr lang="en-US" sz="2400" dirty="0">
                 <a:sym typeface="Wingdings" pitchFamily="2" charset="2"/>
               </a:rPr>
-              <a:t> to check sensitivity </a:t>
-            </a:r>
+              <a:t> shape)</a:t>
+            </a:r>
+          </a:p>
+          <a:p>
+            <a:pPr marL="342900" indent="-342900">
+              <a:buFont typeface="Arial" panose="020B0604020202020204" pitchFamily="34" charset="0"/>
+              <a:buChar char="•"/>
+            </a:pPr>
             <a:r>
               <a:rPr lang="en-US" sz="2400" dirty="0" err="1">
                 <a:sym typeface="Wingdings" pitchFamily="2" charset="2"/>
               </a:rPr>
-              <a:t>wrt</a:t>
+              <a:t>R</a:t>
+            </a:r>
+            <a:r>
+              <a:rPr lang="en-US" sz="2400" baseline="-25000" dirty="0" err="1">
+                <a:sym typeface="Wingdings" pitchFamily="2" charset="2"/>
+              </a:rPr>
+              <a:t>yield</a:t>
+            </a:r>
+            <a:r>
+              <a:rPr lang="en-US" sz="2400" baseline="-25000" dirty="0">
+                <a:sym typeface="Wingdings" pitchFamily="2" charset="2"/>
+              </a:rPr>
+              <a:t> </a:t>
             </a:r>
             <a:r>
               <a:rPr lang="en-US" sz="2400" dirty="0">
                 <a:sym typeface="Wingdings" pitchFamily="2" charset="2"/>
               </a:rPr>
-              <a:t> angular </a:t>
+              <a:t> as transfer factor from SR to </a:t>
             </a:r>
             <a:r>
               <a:rPr lang="en-US" sz="2400" dirty="0" err="1">
                 <a:sym typeface="Wingdings" pitchFamily="2" charset="2"/>
               </a:rPr>
-              <a:t>dists</a:t>
-            </a:r>
-            <a:endParaRPr lang="en-US" sz="2400" dirty="0">
-              <a:sym typeface="Wingdings" pitchFamily="2" charset="2"/>
-            </a:endParaRPr>
-          </a:p>
-          <a:p>
-            <a:pPr marL="1200150" lvl="2" indent="-285750">
-              <a:buFont typeface="Arial" panose="020B0604020202020204" pitchFamily="34" charset="0"/>
-              <a:buChar char="•"/>
-            </a:pPr>
-            <a:r>
-              <a:rPr lang="en-US" sz="2400" dirty="0" err="1">
+              <a:t>SR</a:t>
+            </a:r>
+            <a:r>
+              <a:rPr lang="en-US" sz="2400" baseline="-25000" dirty="0" err="1">
                 <a:sym typeface="Wingdings" pitchFamily="2" charset="2"/>
               </a:rPr>
-              <a:t>mJJ</a:t>
+              <a:t>c</a:t>
             </a:r>
             <a:r>
               <a:rPr lang="en-US" sz="2400" dirty="0">
                 <a:sym typeface="Wingdings" pitchFamily="2" charset="2"/>
               </a:rPr>
-              <a:t> cut set to 1.5 </a:t>
-            </a:r>
-            <a:r>
-              <a:rPr lang="en-US" sz="2400" dirty="0" err="1">
-                <a:sym typeface="Wingdings" pitchFamily="2" charset="2"/>
-              </a:rPr>
-              <a:t>TeV</a:t>
-            </a:r>
-            <a:endParaRPr lang="en-US" sz="2400" dirty="0">
-              <a:sym typeface="Wingdings" pitchFamily="2" charset="2"/>
-            </a:endParaRPr>
-          </a:p>
-          <a:p>
-            <a:pPr marL="1200150" lvl="2" indent="-285750">
-              <a:buFont typeface="Arial" panose="020B0604020202020204" pitchFamily="34" charset="0"/>
-              <a:buChar char="•"/>
-            </a:pPr>
-            <a:r>
-              <a:rPr lang="en-US" sz="2400" dirty="0">
-                <a:sym typeface="Wingdings" pitchFamily="2" charset="2"/>
-              </a:rPr>
-              <a:t>For each </a:t>
-            </a:r>
-            <a:r>
-              <a:rPr lang="en-US" sz="2400" dirty="0" err="1">
-                <a:sym typeface="Wingdings" pitchFamily="2" charset="2"/>
-              </a:rPr>
-              <a:t>mJJ</a:t>
-            </a:r>
-            <a:r>
-              <a:rPr lang="en-US" sz="2400" dirty="0">
-                <a:sym typeface="Wingdings" pitchFamily="2" charset="2"/>
-              </a:rPr>
-              <a:t> cut, plot Z’ for a set of masses (1% and 10% width) [2,2.5,3]</a:t>
-            </a:r>
-            <a:r>
-              <a:rPr lang="en-US" sz="2400" dirty="0" err="1">
-                <a:sym typeface="Wingdings" pitchFamily="2" charset="2"/>
-              </a:rPr>
-              <a:t>TeV</a:t>
-            </a:r>
-            <a:r>
-              <a:rPr lang="en-US" sz="2400" dirty="0">
-                <a:sym typeface="Wingdings" pitchFamily="2" charset="2"/>
-              </a:rPr>
-              <a:t> and Nominal TT angular distributions</a:t>
-            </a:r>
-          </a:p>
-          <a:p>
-            <a:pPr marL="1200150" lvl="2" indent="-285750">
-              <a:buFont typeface="Arial" panose="020B0604020202020204" pitchFamily="34" charset="0"/>
-              <a:buChar char="•"/>
-            </a:pPr>
-            <a:r>
-              <a:rPr lang="en-US" sz="2400" dirty="0">
-                <a:sym typeface="Wingdings" pitchFamily="2" charset="2"/>
-              </a:rPr>
-              <a:t>Angular distributions for 2016</a:t>
-            </a:r>
-          </a:p>
-          <a:p>
-            <a:pPr marL="742950" lvl="1" indent="-285750">
+              <a:t> where the measurement is performed</a:t>
+            </a:r>
+          </a:p>
+          <a:p>
+            <a:pPr marL="342900" indent="-342900">
               <a:buFont typeface="Arial" panose="020B0604020202020204" pitchFamily="34" charset="0"/>
               <a:buChar char="•"/>
             </a:pPr>
@@ -9079,26 +10588,211 @@
             </a:endParaRPr>
           </a:p>
           <a:p>
-            <a:pPr marL="285750" indent="-285750">
+            <a:pPr marL="342900" indent="-342900">
               <a:buFont typeface="Arial" panose="020B0604020202020204" pitchFamily="34" charset="0"/>
               <a:buChar char="•"/>
             </a:pPr>
             <a:r>
+              <a:rPr lang="en-US" sz="2400" dirty="0">
+                <a:sym typeface="Wingdings" pitchFamily="2" charset="2"/>
+              </a:rPr>
+              <a:t>Signal: S(x) for </a:t>
+            </a:r>
+            <a:r>
+              <a:rPr lang="el-GR" sz="2400" dirty="0">
+                <a:sym typeface="Wingdings" pitchFamily="2" charset="2"/>
+              </a:rPr>
+              <a:t>χ </a:t>
+            </a:r>
+            <a:r>
+              <a:rPr lang="en-US" sz="2400" dirty="0">
+                <a:sym typeface="Wingdings" pitchFamily="2" charset="2"/>
+              </a:rPr>
+              <a:t>distribution (ttbar)</a:t>
+            </a:r>
+          </a:p>
+          <a:p>
+            <a:pPr marL="342900" indent="-342900">
+              <a:buFont typeface="Arial" panose="020B0604020202020204" pitchFamily="34" charset="0"/>
+              <a:buChar char="•"/>
+            </a:pPr>
+            <a:r>
+              <a:rPr lang="en-US" sz="2400" dirty="0">
+                <a:sym typeface="Wingdings" pitchFamily="2" charset="2"/>
+              </a:rPr>
+              <a:t>Stack histograms: (</a:t>
+            </a:r>
+            <a:r>
               <a:rPr lang="en-US" sz="2400" dirty="0" err="1">
                 <a:sym typeface="Wingdings" pitchFamily="2" charset="2"/>
               </a:rPr>
-              <a:t>PoS</a:t>
+              <a:t>m</a:t>
+            </a:r>
+            <a:r>
+              <a:rPr lang="en-US" sz="2400" baseline="-25000" dirty="0" err="1">
+                <a:sym typeface="Wingdings" pitchFamily="2" charset="2"/>
+              </a:rPr>
+              <a:t>Z</a:t>
+            </a:r>
+            <a:r>
+              <a:rPr lang="en-US" sz="2400" baseline="-25000" dirty="0">
+                <a:sym typeface="Wingdings" pitchFamily="2" charset="2"/>
+              </a:rPr>
+              <a:t>’</a:t>
             </a:r>
             <a:r>
               <a:rPr lang="en-US" sz="2400" dirty="0">
                 <a:sym typeface="Wingdings" pitchFamily="2" charset="2"/>
               </a:rPr>
-              <a:t> for ICHEP 2020 </a:t>
-            </a:r>
-            <a:endParaRPr lang="en-US" sz="2400" dirty="0"/>
-          </a:p>
-          <a:p>
-            <a:endParaRPr lang="en-US" sz="2400" dirty="0"/>
+              <a:t> 2, 2.5TeV and widths 1%, 10%)</a:t>
+            </a:r>
+          </a:p>
+          <a:p>
+            <a:pPr marL="800100" lvl="1" indent="-342900">
+              <a:buFont typeface="Arial" panose="020B0604020202020204" pitchFamily="34" charset="0"/>
+              <a:buChar char="•"/>
+            </a:pPr>
+            <a:r>
+              <a:rPr lang="en-US" sz="2400" dirty="0">
+                <a:sym typeface="Wingdings" pitchFamily="2" charset="2"/>
+              </a:rPr>
+              <a:t>Data vs MC (</a:t>
+            </a:r>
+            <a:r>
+              <a:rPr lang="en-US" sz="2400" dirty="0" err="1">
+                <a:sym typeface="Wingdings" pitchFamily="2" charset="2"/>
+              </a:rPr>
+              <a:t>qcd</a:t>
+            </a:r>
+            <a:r>
+              <a:rPr lang="en-US" sz="2400" dirty="0">
+                <a:sym typeface="Wingdings" pitchFamily="2" charset="2"/>
+              </a:rPr>
+              <a:t> scaled with k-factor to data)</a:t>
+            </a:r>
+          </a:p>
+          <a:p>
+            <a:pPr marL="800100" lvl="1" indent="-342900">
+              <a:buFont typeface="Arial" panose="020B0604020202020204" pitchFamily="34" charset="0"/>
+              <a:buChar char="•"/>
+            </a:pPr>
+            <a:r>
+              <a:rPr lang="en-US" sz="2400" dirty="0" err="1">
+                <a:sym typeface="Wingdings" pitchFamily="2" charset="2"/>
+              </a:rPr>
+              <a:t>TTbar</a:t>
+            </a:r>
+            <a:r>
+              <a:rPr lang="en-US" sz="2400" dirty="0">
+                <a:sym typeface="Wingdings" pitchFamily="2" charset="2"/>
+              </a:rPr>
+              <a:t> scaled with signal strength </a:t>
+            </a:r>
+          </a:p>
+          <a:p>
+            <a:pPr marL="800100" lvl="1" indent="-342900">
+              <a:buFont typeface="Arial" panose="020B0604020202020204" pitchFamily="34" charset="0"/>
+              <a:buChar char="•"/>
+            </a:pPr>
+            <a:r>
+              <a:rPr lang="en-US" sz="2400" dirty="0">
+                <a:sym typeface="Wingdings" pitchFamily="2" charset="2"/>
+              </a:rPr>
+              <a:t>This plot can serve also as </a:t>
+            </a:r>
+            <a:r>
+              <a:rPr lang="en-US" sz="2400" dirty="0" err="1">
+                <a:sym typeface="Wingdings" pitchFamily="2" charset="2"/>
+              </a:rPr>
+              <a:t>prefit</a:t>
+            </a:r>
+            <a:r>
+              <a:rPr lang="en-US" sz="2400" dirty="0">
+                <a:sym typeface="Wingdings" pitchFamily="2" charset="2"/>
+              </a:rPr>
+              <a:t> distribution</a:t>
+            </a:r>
+          </a:p>
+          <a:p>
+            <a:pPr marL="342900" indent="-342900">
+              <a:buFont typeface="Arial" panose="020B0604020202020204" pitchFamily="34" charset="0"/>
+              <a:buChar char="•"/>
+            </a:pPr>
+            <a:endParaRPr lang="en-US" sz="2400" dirty="0">
+              <a:sym typeface="Wingdings" pitchFamily="2" charset="2"/>
+            </a:endParaRPr>
+          </a:p>
+          <a:p>
+            <a:pPr marL="342900" indent="-342900">
+              <a:buFont typeface="Arial" panose="020B0604020202020204" pitchFamily="34" charset="0"/>
+              <a:buChar char="•"/>
+            </a:pPr>
+            <a:r>
+              <a:rPr lang="en-US" sz="2400" dirty="0" err="1">
+                <a:sym typeface="Wingdings" pitchFamily="2" charset="2"/>
+              </a:rPr>
+              <a:t>Postfit</a:t>
+            </a:r>
+            <a:r>
+              <a:rPr lang="en-US" sz="2400" dirty="0">
+                <a:sym typeface="Wingdings" pitchFamily="2" charset="2"/>
+              </a:rPr>
+              <a:t> distribution (</a:t>
+            </a:r>
+            <a:r>
+              <a:rPr lang="en-US" sz="2400" dirty="0" err="1">
+                <a:sym typeface="Wingdings" pitchFamily="2" charset="2"/>
+              </a:rPr>
+              <a:t>m</a:t>
+            </a:r>
+            <a:r>
+              <a:rPr lang="en-US" sz="2400" baseline="-25000" dirty="0" err="1">
+                <a:sym typeface="Wingdings" pitchFamily="2" charset="2"/>
+              </a:rPr>
+              <a:t>Z</a:t>
+            </a:r>
+            <a:r>
+              <a:rPr lang="en-US" sz="2400" baseline="-25000" dirty="0">
+                <a:sym typeface="Wingdings" pitchFamily="2" charset="2"/>
+              </a:rPr>
+              <a:t>’</a:t>
+            </a:r>
+            <a:r>
+              <a:rPr lang="en-US" sz="2400" dirty="0">
+                <a:sym typeface="Wingdings" pitchFamily="2" charset="2"/>
+              </a:rPr>
+              <a:t> 2, 2.5TeV and widths 1%, </a:t>
+            </a:r>
+            <a:r>
+              <a:rPr lang="en-US" sz="2400">
+                <a:sym typeface="Wingdings" pitchFamily="2" charset="2"/>
+              </a:rPr>
+              <a:t>10%)</a:t>
+            </a:r>
+            <a:endParaRPr lang="en-US" sz="2400" dirty="0">
+              <a:sym typeface="Wingdings" pitchFamily="2" charset="2"/>
+            </a:endParaRPr>
+          </a:p>
+          <a:p>
+            <a:pPr marL="342900" indent="-342900">
+              <a:buFont typeface="Arial" panose="020B0604020202020204" pitchFamily="34" charset="0"/>
+              <a:buChar char="•"/>
+            </a:pPr>
+            <a:r>
+              <a:rPr lang="en-US" sz="2400" dirty="0">
+                <a:sym typeface="Wingdings" pitchFamily="2" charset="2"/>
+              </a:rPr>
+              <a:t>Asymptotic Limits (Brazilian plots)</a:t>
+            </a:r>
+          </a:p>
+          <a:p>
+            <a:pPr marL="800100" lvl="1" indent="-342900">
+              <a:buFont typeface="Arial" panose="020B0604020202020204" pitchFamily="34" charset="0"/>
+              <a:buChar char="•"/>
+            </a:pPr>
+            <a:endParaRPr lang="en-US" sz="2400" dirty="0">
+              <a:sym typeface="Wingdings" pitchFamily="2" charset="2"/>
+            </a:endParaRPr>
           </a:p>
         </p:txBody>
       </p:sp>
@@ -10729,7 +12423,7 @@
                     <a:cs typeface="Calibri" panose="020F0502020204030204" pitchFamily="34" charset="0"/>
                     <a:sym typeface="Wingdings" pitchFamily="2" charset="2"/>
                   </a:rPr>
-                  <a:t> in SR (</a:t>
+                  <a:t> in SRA (</a:t>
                 </a:r>
                 <a:r>
                   <a:rPr lang="en-US" dirty="0" err="1">
@@ -11777,7 +13471,7 @@
             <a:pPr algn="ctr"/>
             <a:r>
               <a:rPr lang="en-GB" sz="2800" u="sng" dirty="0"/>
-              <a:t>Angular Distributions</a:t>
+              <a:t>Contamination Plots in New SR</a:t>
             </a:r>
             <a:endParaRPr lang="en-GB" sz="2800" u="sng" dirty="0">
               <a:solidFill>
@@ -11787,12 +13481,86 @@
           </a:p>
         </p:txBody>
       </p:sp>
+      <p:sp>
+        <p:nvSpPr>
+          <p:cNvPr id="10" name="Rectangle 9">
+            <a:extLst>
+              <a:ext uri="{FF2B5EF4-FFF2-40B4-BE49-F238E27FC236}">
+                <a16:creationId xmlns:a16="http://schemas.microsoft.com/office/drawing/2014/main" id="{355721DA-255A-684A-8619-9EF3DA2BD0B0}"/>
+              </a:ext>
+            </a:extLst>
+          </p:cNvPr>
+          <p:cNvSpPr/>
+          <p:nvPr/>
+        </p:nvSpPr>
+        <p:spPr>
+          <a:xfrm>
+            <a:off x="5356796" y="679200"/>
+            <a:ext cx="1473801" cy="369332"/>
+          </a:xfrm>
+          <a:prstGeom prst="rect">
+            <a:avLst/>
+          </a:prstGeom>
+        </p:spPr>
+        <p:txBody>
+          <a:bodyPr wrap="none">
+            <a:spAutoFit/>
+          </a:bodyPr>
+          <a:lstStyle/>
+          <a:p>
+            <a:r>
+              <a:rPr lang="en-US" dirty="0" err="1">
+                <a:solidFill>
+                  <a:srgbClr val="FF0000"/>
+                </a:solidFill>
+                <a:latin typeface="Calibri" panose="020F0502020204030204" pitchFamily="34" charset="0"/>
+                <a:cs typeface="Calibri" panose="020F0502020204030204" pitchFamily="34" charset="0"/>
+                <a:sym typeface="Wingdings" pitchFamily="2" charset="2"/>
+              </a:rPr>
+              <a:t>mJJ</a:t>
+            </a:r>
+            <a:r>
+              <a:rPr lang="en-US" dirty="0">
+                <a:solidFill>
+                  <a:srgbClr val="FF0000"/>
+                </a:solidFill>
+                <a:latin typeface="Calibri" panose="020F0502020204030204" pitchFamily="34" charset="0"/>
+                <a:cs typeface="Calibri" panose="020F0502020204030204" pitchFamily="34" charset="0"/>
+                <a:sym typeface="Wingdings" pitchFamily="2" charset="2"/>
+              </a:rPr>
+              <a:t> &gt; 1.5 </a:t>
+            </a:r>
+            <a:r>
+              <a:rPr lang="en-US" dirty="0" err="1">
+                <a:solidFill>
+                  <a:srgbClr val="FF0000"/>
+                </a:solidFill>
+                <a:latin typeface="Calibri" panose="020F0502020204030204" pitchFamily="34" charset="0"/>
+                <a:cs typeface="Calibri" panose="020F0502020204030204" pitchFamily="34" charset="0"/>
+                <a:sym typeface="Wingdings" pitchFamily="2" charset="2"/>
+              </a:rPr>
+              <a:t>TeV</a:t>
+            </a:r>
+            <a:r>
+              <a:rPr lang="en-US" dirty="0">
+                <a:solidFill>
+                  <a:srgbClr val="FF0000"/>
+                </a:solidFill>
+                <a:latin typeface="Calibri" panose="020F0502020204030204" pitchFamily="34" charset="0"/>
+                <a:cs typeface="Calibri" panose="020F0502020204030204" pitchFamily="34" charset="0"/>
+                <a:sym typeface="Wingdings" pitchFamily="2" charset="2"/>
+              </a:rPr>
+              <a:t> </a:t>
+            </a:r>
+          </a:p>
+        </p:txBody>
+      </p:sp>
       <p:pic>
         <p:nvPicPr>
-          <p:cNvPr id="5" name="Picture 4">
+          <p:cNvPr id="18" name="Picture 17">
             <a:extLst>
               <a:ext uri="{FF2B5EF4-FFF2-40B4-BE49-F238E27FC236}">
-                <a16:creationId xmlns:a16="http://schemas.microsoft.com/office/drawing/2014/main" id="{C905207C-C85F-1441-96E0-E1D1B77156FB}"/>
+                <a16:creationId xmlns:a16="http://schemas.microsoft.com/office/drawing/2014/main" id="{5AD4A1C7-7882-9848-A73D-81C1EC8443B6}"/>
               </a:ext>
             </a:extLst>
           </p:cNvPr>
@@ -11809,8 +13577,8 @@
         </p:blipFill>
         <p:spPr>
           <a:xfrm rot="5400000">
-            <a:off x="949689" y="440626"/>
-            <a:ext cx="4311269" cy="5976747"/>
+            <a:off x="458533" y="660587"/>
+            <a:ext cx="5059680" cy="5976747"/>
           </a:xfrm>
           <a:prstGeom prst="rect">
             <a:avLst/>
@@ -11819,10 +13587,10 @@
       </p:pic>
       <p:pic>
         <p:nvPicPr>
-          <p:cNvPr id="8" name="Picture 7">
+          <p:cNvPr id="20" name="Picture 19">
             <a:extLst>
               <a:ext uri="{FF2B5EF4-FFF2-40B4-BE49-F238E27FC236}">
-                <a16:creationId xmlns:a16="http://schemas.microsoft.com/office/drawing/2014/main" id="{956D8683-BD1A-7B46-BC30-DFBD85238080}"/>
+                <a16:creationId xmlns:a16="http://schemas.microsoft.com/office/drawing/2014/main" id="{4124FDEA-2B94-B44C-ABEC-8469AAD4C5FB}"/>
               </a:ext>
             </a:extLst>
           </p:cNvPr>
@@ -11839,88 +13607,14 @@
         </p:blipFill>
         <p:spPr>
           <a:xfrm rot="5400000">
-            <a:off x="6926436" y="440625"/>
-            <a:ext cx="4311269" cy="5976747"/>
+            <a:off x="6552229" y="660587"/>
+            <a:ext cx="5059680" cy="5976747"/>
           </a:xfrm>
           <a:prstGeom prst="rect">
             <a:avLst/>
           </a:prstGeom>
         </p:spPr>
       </p:pic>
-      <p:sp>
-        <p:nvSpPr>
-          <p:cNvPr id="10" name="Rectangle 9">
-            <a:extLst>
-              <a:ext uri="{FF2B5EF4-FFF2-40B4-BE49-F238E27FC236}">
-                <a16:creationId xmlns:a16="http://schemas.microsoft.com/office/drawing/2014/main" id="{355721DA-255A-684A-8619-9EF3DA2BD0B0}"/>
-              </a:ext>
-            </a:extLst>
-          </p:cNvPr>
-          <p:cNvSpPr/>
-          <p:nvPr/>
-        </p:nvSpPr>
-        <p:spPr>
-          <a:xfrm>
-            <a:off x="5356796" y="679200"/>
-            <a:ext cx="1473801" cy="369332"/>
-          </a:xfrm>
-          <a:prstGeom prst="rect">
-            <a:avLst/>
-          </a:prstGeom>
-        </p:spPr>
-        <p:txBody>
-          <a:bodyPr wrap="none">
-            <a:spAutoFit/>
-          </a:bodyPr>
-          <a:lstStyle/>
-          <a:p>
-            <a:r>
-              <a:rPr lang="en-US" dirty="0" err="1">
-                <a:solidFill>
-                  <a:srgbClr val="FF0000"/>
-                </a:solidFill>
-                <a:latin typeface="Calibri" panose="020F0502020204030204" pitchFamily="34" charset="0"/>
-                <a:cs typeface="Calibri" panose="020F0502020204030204" pitchFamily="34" charset="0"/>
-                <a:sym typeface="Wingdings" pitchFamily="2" charset="2"/>
-              </a:rPr>
-              <a:t>mJJ</a:t>
-            </a:r>
-            <a:r>
-              <a:rPr lang="en-US" dirty="0">
-                <a:solidFill>
-                  <a:srgbClr val="FF0000"/>
-                </a:solidFill>
-                <a:latin typeface="Calibri" panose="020F0502020204030204" pitchFamily="34" charset="0"/>
-                <a:cs typeface="Calibri" panose="020F0502020204030204" pitchFamily="34" charset="0"/>
-                <a:sym typeface="Wingdings" pitchFamily="2" charset="2"/>
-              </a:rPr>
-              <a:t> &gt; 1.5 </a:t>
-            </a:r>
-            <a:r>
-              <a:rPr lang="en-US" dirty="0" err="1">
-                <a:solidFill>
-                  <a:srgbClr val="FF0000"/>
-                </a:solidFill>
-                <a:latin typeface="Calibri" panose="020F0502020204030204" pitchFamily="34" charset="0"/>
-                <a:cs typeface="Calibri" panose="020F0502020204030204" pitchFamily="34" charset="0"/>
-                <a:sym typeface="Wingdings" pitchFamily="2" charset="2"/>
-              </a:rPr>
-              <a:t>TeV</a:t>
-            </a:r>
-            <a:r>
-              <a:rPr lang="en-US" dirty="0">
-                <a:solidFill>
-                  <a:srgbClr val="FF0000"/>
-                </a:solidFill>
-                <a:latin typeface="Calibri" panose="020F0502020204030204" pitchFamily="34" charset="0"/>
-                <a:cs typeface="Calibri" panose="020F0502020204030204" pitchFamily="34" charset="0"/>
-                <a:sym typeface="Wingdings" pitchFamily="2" charset="2"/>
-              </a:rPr>
-              <a:t> </a:t>
-            </a:r>
-          </a:p>
-        </p:txBody>
-      </p:sp>
     </p:spTree>
     <p:extLst>
       <p:ext uri="{BB962C8B-B14F-4D97-AF65-F5344CB8AC3E}">
@@ -12072,15 +13766,7 @@
             <a:pPr algn="ctr"/>
             <a:r>
               <a:rPr lang="en-GB" sz="2800" u="sng" dirty="0"/>
-              <a:t>Angular Distributions (</a:t>
-            </a:r>
-            <a:r>
-              <a:rPr lang="en-GB" sz="2800" u="sng" dirty="0" err="1"/>
-              <a:t>Prefit</a:t>
-            </a:r>
-            <a:r>
-              <a:rPr lang="en-GB" sz="2800" u="sng" dirty="0"/>
-              <a:t>)</a:t>
+              <a:t>Closure Tests in New SR (CR)</a:t>
             </a:r>
             <a:endParaRPr lang="en-GB" sz="2800" u="sng" dirty="0">
               <a:solidFill>
@@ -12090,12 +13776,86 @@
           </a:p>
         </p:txBody>
       </p:sp>
+      <p:sp>
+        <p:nvSpPr>
+          <p:cNvPr id="10" name="Rectangle 9">
+            <a:extLst>
+              <a:ext uri="{FF2B5EF4-FFF2-40B4-BE49-F238E27FC236}">
+                <a16:creationId xmlns:a16="http://schemas.microsoft.com/office/drawing/2014/main" id="{355721DA-255A-684A-8619-9EF3DA2BD0B0}"/>
+              </a:ext>
+            </a:extLst>
+          </p:cNvPr>
+          <p:cNvSpPr/>
+          <p:nvPr/>
+        </p:nvSpPr>
+        <p:spPr>
+          <a:xfrm>
+            <a:off x="5356796" y="514310"/>
+            <a:ext cx="1473801" cy="369332"/>
+          </a:xfrm>
+          <a:prstGeom prst="rect">
+            <a:avLst/>
+          </a:prstGeom>
+        </p:spPr>
+        <p:txBody>
+          <a:bodyPr wrap="none">
+            <a:spAutoFit/>
+          </a:bodyPr>
+          <a:lstStyle/>
+          <a:p>
+            <a:r>
+              <a:rPr lang="en-US" dirty="0" err="1">
+                <a:solidFill>
+                  <a:srgbClr val="FF0000"/>
+                </a:solidFill>
+                <a:latin typeface="Calibri" panose="020F0502020204030204" pitchFamily="34" charset="0"/>
+                <a:cs typeface="Calibri" panose="020F0502020204030204" pitchFamily="34" charset="0"/>
+                <a:sym typeface="Wingdings" pitchFamily="2" charset="2"/>
+              </a:rPr>
+              <a:t>mJJ</a:t>
+            </a:r>
+            <a:r>
+              <a:rPr lang="en-US" dirty="0">
+                <a:solidFill>
+                  <a:srgbClr val="FF0000"/>
+                </a:solidFill>
+                <a:latin typeface="Calibri" panose="020F0502020204030204" pitchFamily="34" charset="0"/>
+                <a:cs typeface="Calibri" panose="020F0502020204030204" pitchFamily="34" charset="0"/>
+                <a:sym typeface="Wingdings" pitchFamily="2" charset="2"/>
+              </a:rPr>
+              <a:t> &gt; 1.5 </a:t>
+            </a:r>
+            <a:r>
+              <a:rPr lang="en-US" dirty="0" err="1">
+                <a:solidFill>
+                  <a:srgbClr val="FF0000"/>
+                </a:solidFill>
+                <a:latin typeface="Calibri" panose="020F0502020204030204" pitchFamily="34" charset="0"/>
+                <a:cs typeface="Calibri" panose="020F0502020204030204" pitchFamily="34" charset="0"/>
+                <a:sym typeface="Wingdings" pitchFamily="2" charset="2"/>
+              </a:rPr>
+              <a:t>TeV</a:t>
+            </a:r>
+            <a:r>
+              <a:rPr lang="en-US" dirty="0">
+                <a:solidFill>
+                  <a:srgbClr val="FF0000"/>
+                </a:solidFill>
+                <a:latin typeface="Calibri" panose="020F0502020204030204" pitchFamily="34" charset="0"/>
+                <a:cs typeface="Calibri" panose="020F0502020204030204" pitchFamily="34" charset="0"/>
+                <a:sym typeface="Wingdings" pitchFamily="2" charset="2"/>
+              </a:rPr>
+              <a:t> </a:t>
+            </a:r>
+          </a:p>
+        </p:txBody>
+      </p:sp>
       <p:pic>
         <p:nvPicPr>
-          <p:cNvPr id="14" name="Picture 13">
+          <p:cNvPr id="15" name="Picture 14">
             <a:extLst>
               <a:ext uri="{FF2B5EF4-FFF2-40B4-BE49-F238E27FC236}">
-                <a16:creationId xmlns:a16="http://schemas.microsoft.com/office/drawing/2014/main" id="{8E81C82E-1413-7940-A637-5A375F964D29}"/>
+                <a16:creationId xmlns:a16="http://schemas.microsoft.com/office/drawing/2014/main" id="{68CE4810-09E5-7841-9191-7E42B840789E}"/>
               </a:ext>
             </a:extLst>
           </p:cNvPr>
@@ -12112,8 +13872,8 @@
         </p:blipFill>
         <p:spPr>
           <a:xfrm rot="5400000">
-            <a:off x="2179838" y="-128325"/>
-            <a:ext cx="3012694" cy="4176522"/>
+            <a:off x="458533" y="581921"/>
+            <a:ext cx="5059680" cy="5976747"/>
           </a:xfrm>
           <a:prstGeom prst="rect">
             <a:avLst/>
@@ -12122,10 +13882,10 @@
       </p:pic>
       <p:pic>
         <p:nvPicPr>
-          <p:cNvPr id="16" name="Picture 15">
+          <p:cNvPr id="17" name="Picture 16">
             <a:extLst>
               <a:ext uri="{FF2B5EF4-FFF2-40B4-BE49-F238E27FC236}">
-                <a16:creationId xmlns:a16="http://schemas.microsoft.com/office/drawing/2014/main" id="{7C17550C-8B41-094D-881E-2E7A428E4D1C}"/>
+                <a16:creationId xmlns:a16="http://schemas.microsoft.com/office/drawing/2014/main" id="{3BB7B4BD-B20F-0649-A772-675E030F0766}"/>
               </a:ext>
             </a:extLst>
           </p:cNvPr>
@@ -12142,319 +13902,18 @@
         </p:blipFill>
         <p:spPr>
           <a:xfrm rot="5400000">
-            <a:off x="2179838" y="2764406"/>
-            <a:ext cx="3012694" cy="4176522"/>
+            <a:off x="6552229" y="584556"/>
+            <a:ext cx="5059680" cy="5976747"/>
           </a:xfrm>
           <a:prstGeom prst="rect">
             <a:avLst/>
           </a:prstGeom>
         </p:spPr>
       </p:pic>
-      <p:pic>
-        <p:nvPicPr>
-          <p:cNvPr id="18" name="Picture 17">
-            <a:extLst>
-              <a:ext uri="{FF2B5EF4-FFF2-40B4-BE49-F238E27FC236}">
-                <a16:creationId xmlns:a16="http://schemas.microsoft.com/office/drawing/2014/main" id="{191E9236-5394-DF44-B882-74AF4A0C7B3B}"/>
-              </a:ext>
-            </a:extLst>
-          </p:cNvPr>
-          <p:cNvPicPr>
-            <a:picLocks noChangeAspect="1"/>
-          </p:cNvPicPr>
-          <p:nvPr/>
-        </p:nvPicPr>
-        <p:blipFill>
-          <a:blip r:embed="rId4"/>
-          <a:stretch>
-            <a:fillRect/>
-          </a:stretch>
-        </p:blipFill>
-        <p:spPr>
-          <a:xfrm rot="5400000">
-            <a:off x="6999468" y="-128325"/>
-            <a:ext cx="3012694" cy="4176522"/>
-          </a:xfrm>
-          <a:prstGeom prst="rect">
-            <a:avLst/>
-          </a:prstGeom>
-        </p:spPr>
-      </p:pic>
-      <p:pic>
-        <p:nvPicPr>
-          <p:cNvPr id="20" name="Picture 19">
-            <a:extLst>
-              <a:ext uri="{FF2B5EF4-FFF2-40B4-BE49-F238E27FC236}">
-                <a16:creationId xmlns:a16="http://schemas.microsoft.com/office/drawing/2014/main" id="{4B8ED8B1-4EE1-334B-9269-9FA452F48359}"/>
-              </a:ext>
-            </a:extLst>
-          </p:cNvPr>
-          <p:cNvPicPr>
-            <a:picLocks noChangeAspect="1"/>
-          </p:cNvPicPr>
-          <p:nvPr/>
-        </p:nvPicPr>
-        <p:blipFill>
-          <a:blip r:embed="rId5"/>
-          <a:stretch>
-            <a:fillRect/>
-          </a:stretch>
-        </p:blipFill>
-        <p:spPr>
-          <a:xfrm rot="5400000">
-            <a:off x="7002642" y="2764406"/>
-            <a:ext cx="3012694" cy="4176522"/>
-          </a:xfrm>
-          <a:prstGeom prst="rect">
-            <a:avLst/>
-          </a:prstGeom>
-        </p:spPr>
-      </p:pic>
-      <p:sp>
-        <p:nvSpPr>
-          <p:cNvPr id="21" name="TextBox 20">
-            <a:extLst>
-              <a:ext uri="{FF2B5EF4-FFF2-40B4-BE49-F238E27FC236}">
-                <a16:creationId xmlns:a16="http://schemas.microsoft.com/office/drawing/2014/main" id="{F428E97F-E442-F14E-9CB9-B30F346A9D76}"/>
-              </a:ext>
-            </a:extLst>
-          </p:cNvPr>
-          <p:cNvSpPr txBox="1"/>
-          <p:nvPr/>
-        </p:nvSpPr>
-        <p:spPr>
-          <a:xfrm>
-            <a:off x="0" y="1690657"/>
-            <a:ext cx="2023672" cy="369332"/>
-          </a:xfrm>
-          <a:prstGeom prst="rect">
-            <a:avLst/>
-          </a:prstGeom>
-          <a:noFill/>
-        </p:spPr>
-        <p:txBody>
-          <a:bodyPr wrap="square" rtlCol="0">
-            <a:spAutoFit/>
-          </a:bodyPr>
-          <a:lstStyle/>
-          <a:p>
-            <a:r>
-              <a:rPr lang="en-GR" dirty="0">
-                <a:solidFill>
-                  <a:srgbClr val="FF0000"/>
-                </a:solidFill>
-              </a:rPr>
-              <a:t>M</a:t>
-            </a:r>
-            <a:r>
-              <a:rPr lang="en-GR" baseline="-25000" dirty="0">
-                <a:solidFill>
-                  <a:srgbClr val="FF0000"/>
-                </a:solidFill>
-              </a:rPr>
-              <a:t>z’ </a:t>
-            </a:r>
-            <a:r>
-              <a:rPr lang="en-GR" dirty="0">
-                <a:solidFill>
-                  <a:srgbClr val="FF0000"/>
-                </a:solidFill>
-              </a:rPr>
-              <a:t>=2000, w = 1%</a:t>
-            </a:r>
-          </a:p>
-        </p:txBody>
-      </p:sp>
-      <p:sp>
-        <p:nvSpPr>
-          <p:cNvPr id="22" name="TextBox 21">
-            <a:extLst>
-              <a:ext uri="{FF2B5EF4-FFF2-40B4-BE49-F238E27FC236}">
-                <a16:creationId xmlns:a16="http://schemas.microsoft.com/office/drawing/2014/main" id="{604C635C-AFB0-6A45-A110-C274ACEF6636}"/>
-              </a:ext>
-            </a:extLst>
-          </p:cNvPr>
-          <p:cNvSpPr txBox="1"/>
-          <p:nvPr/>
-        </p:nvSpPr>
-        <p:spPr>
-          <a:xfrm>
-            <a:off x="-60194" y="4668000"/>
-            <a:ext cx="2023672" cy="369332"/>
-          </a:xfrm>
-          <a:prstGeom prst="rect">
-            <a:avLst/>
-          </a:prstGeom>
-          <a:noFill/>
-        </p:spPr>
-        <p:txBody>
-          <a:bodyPr wrap="square" rtlCol="0">
-            <a:spAutoFit/>
-          </a:bodyPr>
-          <a:lstStyle/>
-          <a:p>
-            <a:r>
-              <a:rPr lang="en-GR" dirty="0">
-                <a:solidFill>
-                  <a:srgbClr val="FF0000"/>
-                </a:solidFill>
-              </a:rPr>
-              <a:t>M</a:t>
-            </a:r>
-            <a:r>
-              <a:rPr lang="en-GR" baseline="-25000" dirty="0">
-                <a:solidFill>
-                  <a:srgbClr val="FF0000"/>
-                </a:solidFill>
-              </a:rPr>
-              <a:t>z’ </a:t>
-            </a:r>
-            <a:r>
-              <a:rPr lang="en-GR" dirty="0">
-                <a:solidFill>
-                  <a:srgbClr val="FF0000"/>
-                </a:solidFill>
-              </a:rPr>
-              <a:t>=2000, w = 10%</a:t>
-            </a:r>
-          </a:p>
-        </p:txBody>
-      </p:sp>
-      <p:sp>
-        <p:nvSpPr>
-          <p:cNvPr id="23" name="TextBox 22">
-            <a:extLst>
-              <a:ext uri="{FF2B5EF4-FFF2-40B4-BE49-F238E27FC236}">
-                <a16:creationId xmlns:a16="http://schemas.microsoft.com/office/drawing/2014/main" id="{7328C7EA-20B2-594C-95E0-5D0A7AB50953}"/>
-              </a:ext>
-            </a:extLst>
-          </p:cNvPr>
-          <p:cNvSpPr txBox="1"/>
-          <p:nvPr/>
-        </p:nvSpPr>
-        <p:spPr>
-          <a:xfrm>
-            <a:off x="10168328" y="1690657"/>
-            <a:ext cx="2023672" cy="369332"/>
-          </a:xfrm>
-          <a:prstGeom prst="rect">
-            <a:avLst/>
-          </a:prstGeom>
-          <a:noFill/>
-        </p:spPr>
-        <p:txBody>
-          <a:bodyPr wrap="square" rtlCol="0">
-            <a:spAutoFit/>
-          </a:bodyPr>
-          <a:lstStyle/>
-          <a:p>
-            <a:r>
-              <a:rPr lang="en-GR" dirty="0">
-                <a:solidFill>
-                  <a:srgbClr val="FF0000"/>
-                </a:solidFill>
-              </a:rPr>
-              <a:t>M</a:t>
-            </a:r>
-            <a:r>
-              <a:rPr lang="en-GR" baseline="-25000" dirty="0">
-                <a:solidFill>
-                  <a:srgbClr val="FF0000"/>
-                </a:solidFill>
-              </a:rPr>
-              <a:t>z’ </a:t>
-            </a:r>
-            <a:r>
-              <a:rPr lang="en-GR">
-                <a:solidFill>
-                  <a:srgbClr val="FF0000"/>
-                </a:solidFill>
-              </a:rPr>
-              <a:t>=2500</a:t>
-            </a:r>
-            <a:r>
-              <a:rPr lang="en-GR" dirty="0">
-                <a:solidFill>
-                  <a:srgbClr val="FF0000"/>
-                </a:solidFill>
-              </a:rPr>
-              <a:t>, w </a:t>
-            </a:r>
-            <a:r>
-              <a:rPr lang="en-GR">
-                <a:solidFill>
-                  <a:srgbClr val="FF0000"/>
-                </a:solidFill>
-              </a:rPr>
-              <a:t>= 1%</a:t>
-            </a:r>
-            <a:endParaRPr lang="en-GR" dirty="0">
-              <a:solidFill>
-                <a:srgbClr val="FF0000"/>
-              </a:solidFill>
-            </a:endParaRPr>
-          </a:p>
-        </p:txBody>
-      </p:sp>
-      <p:sp>
-        <p:nvSpPr>
-          <p:cNvPr id="24" name="TextBox 23">
-            <a:extLst>
-              <a:ext uri="{FF2B5EF4-FFF2-40B4-BE49-F238E27FC236}">
-                <a16:creationId xmlns:a16="http://schemas.microsoft.com/office/drawing/2014/main" id="{2F899BD0-5148-EE45-9F57-F54E80881C8C}"/>
-              </a:ext>
-            </a:extLst>
-          </p:cNvPr>
-          <p:cNvSpPr txBox="1"/>
-          <p:nvPr/>
-        </p:nvSpPr>
-        <p:spPr>
-          <a:xfrm>
-            <a:off x="10168328" y="4668000"/>
-            <a:ext cx="2023672" cy="369332"/>
-          </a:xfrm>
-          <a:prstGeom prst="rect">
-            <a:avLst/>
-          </a:prstGeom>
-          <a:noFill/>
-        </p:spPr>
-        <p:txBody>
-          <a:bodyPr wrap="square" rtlCol="0">
-            <a:spAutoFit/>
-          </a:bodyPr>
-          <a:lstStyle/>
-          <a:p>
-            <a:r>
-              <a:rPr lang="en-GR" dirty="0">
-                <a:solidFill>
-                  <a:srgbClr val="FF0000"/>
-                </a:solidFill>
-              </a:rPr>
-              <a:t>M</a:t>
-            </a:r>
-            <a:r>
-              <a:rPr lang="en-GR" baseline="-25000" dirty="0">
-                <a:solidFill>
-                  <a:srgbClr val="FF0000"/>
-                </a:solidFill>
-              </a:rPr>
-              <a:t>z’ </a:t>
-            </a:r>
-            <a:r>
-              <a:rPr lang="en-GR" dirty="0">
-                <a:solidFill>
-                  <a:srgbClr val="FF0000"/>
-                </a:solidFill>
-              </a:rPr>
-              <a:t>=2500, w = 10%</a:t>
-            </a:r>
-          </a:p>
-        </p:txBody>
-      </p:sp>
     </p:spTree>
     <p:extLst>
       <p:ext uri="{BB962C8B-B14F-4D97-AF65-F5344CB8AC3E}">
-        <p14:creationId xmlns:p14="http://schemas.microsoft.com/office/powerpoint/2010/main" val="4083330330"/>
+        <p14:creationId xmlns:p14="http://schemas.microsoft.com/office/powerpoint/2010/main" val="226817172"/>
       </p:ext>
     </p:extLst>
   </p:cSld>
@@ -12601,16 +14060,26 @@
           <a:p>
             <a:pPr algn="ctr"/>
             <a:r>
+              <a:rPr lang="en-GB" sz="2800" u="sng" dirty="0" err="1"/>
+              <a:t>Ryields</a:t>
+            </a:r>
+            <a:r>
               <a:rPr lang="en-GB" sz="2800" u="sng" dirty="0"/>
-              <a:t>Angular Distributions (</a:t>
+              <a:t> (with closure test) from </a:t>
             </a:r>
             <a:r>
               <a:rPr lang="en-GB" sz="2800" u="sng" dirty="0" err="1"/>
-              <a:t>PostFit</a:t>
+              <a:t>mJJ</a:t>
             </a:r>
             <a:r>
               <a:rPr lang="en-GB" sz="2800" u="sng" dirty="0"/>
-              <a:t>)</a:t>
+              <a:t> &gt; 1TeV region </a:t>
+            </a:r>
+            <a:r>
+              <a:rPr lang="en-GB" sz="2800" u="sng" dirty="0">
+                <a:sym typeface="Wingdings" pitchFamily="2" charset="2"/>
+              </a:rPr>
+              <a:t> 1.5TeV Signal Region</a:t>
             </a:r>
             <a:endParaRPr lang="en-GB" sz="2800" u="sng" dirty="0">
               <a:solidFill>
@@ -12620,10 +14089,70 @@
           </a:p>
         </p:txBody>
       </p:sp>
+      <p:pic>
+        <p:nvPicPr>
+          <p:cNvPr id="4" name="Picture 3">
+            <a:extLst>
+              <a:ext uri="{FF2B5EF4-FFF2-40B4-BE49-F238E27FC236}">
+                <a16:creationId xmlns:a16="http://schemas.microsoft.com/office/drawing/2014/main" id="{1DA6CC2C-CF44-6F43-A64F-AE57D747C076}"/>
+              </a:ext>
+            </a:extLst>
+          </p:cNvPr>
+          <p:cNvPicPr>
+            <a:picLocks noChangeAspect="1"/>
+          </p:cNvPicPr>
+          <p:nvPr/>
+        </p:nvPicPr>
+        <p:blipFill>
+          <a:blip r:embed="rId2"/>
+          <a:stretch>
+            <a:fillRect/>
+          </a:stretch>
+        </p:blipFill>
+        <p:spPr>
+          <a:xfrm rot="5400000">
+            <a:off x="862204" y="440626"/>
+            <a:ext cx="4311269" cy="5976747"/>
+          </a:xfrm>
+          <a:prstGeom prst="rect">
+            <a:avLst/>
+          </a:prstGeom>
+        </p:spPr>
+      </p:pic>
+      <p:pic>
+        <p:nvPicPr>
+          <p:cNvPr id="6" name="Picture 5">
+            <a:extLst>
+              <a:ext uri="{FF2B5EF4-FFF2-40B4-BE49-F238E27FC236}">
+                <a16:creationId xmlns:a16="http://schemas.microsoft.com/office/drawing/2014/main" id="{E297916D-9E4E-5447-88F5-7FDE4F76D7D9}"/>
+              </a:ext>
+            </a:extLst>
+          </p:cNvPr>
+          <p:cNvPicPr>
+            <a:picLocks noChangeAspect="1"/>
+          </p:cNvPicPr>
+          <p:nvPr/>
+        </p:nvPicPr>
+        <p:blipFill>
+          <a:blip r:embed="rId3"/>
+          <a:stretch>
+            <a:fillRect/>
+          </a:stretch>
+        </p:blipFill>
+        <p:spPr>
+          <a:xfrm rot="5400000">
+            <a:off x="7003022" y="440625"/>
+            <a:ext cx="4311269" cy="5976747"/>
+          </a:xfrm>
+          <a:prstGeom prst="rect">
+            <a:avLst/>
+          </a:prstGeom>
+        </p:spPr>
+      </p:pic>
     </p:spTree>
     <p:extLst>
       <p:ext uri="{BB962C8B-B14F-4D97-AF65-F5344CB8AC3E}">
-        <p14:creationId xmlns:p14="http://schemas.microsoft.com/office/powerpoint/2010/main" val="3962075035"/>
+        <p14:creationId xmlns:p14="http://schemas.microsoft.com/office/powerpoint/2010/main" val="1465411827"/>
       </p:ext>
     </p:extLst>
   </p:cSld>
@@ -12771,7 +14300,7 @@
             <a:pPr algn="ctr"/>
             <a:r>
               <a:rPr lang="en-GB" sz="2800" u="sng" dirty="0"/>
-              <a:t>Angular Distributions (Brazilian Plot)</a:t>
+              <a:t>Angular Distributions</a:t>
             </a:r>
             <a:endParaRPr lang="en-GB" sz="2800" u="sng" dirty="0">
               <a:solidFill>
@@ -12781,10 +14310,144 @@
           </a:p>
         </p:txBody>
       </p:sp>
+      <p:sp>
+        <p:nvSpPr>
+          <p:cNvPr id="10" name="Rectangle 9">
+            <a:extLst>
+              <a:ext uri="{FF2B5EF4-FFF2-40B4-BE49-F238E27FC236}">
+                <a16:creationId xmlns:a16="http://schemas.microsoft.com/office/drawing/2014/main" id="{355721DA-255A-684A-8619-9EF3DA2BD0B0}"/>
+              </a:ext>
+            </a:extLst>
+          </p:cNvPr>
+          <p:cNvSpPr/>
+          <p:nvPr/>
+        </p:nvSpPr>
+        <p:spPr>
+          <a:xfrm>
+            <a:off x="5356796" y="679200"/>
+            <a:ext cx="1473801" cy="369332"/>
+          </a:xfrm>
+          <a:prstGeom prst="rect">
+            <a:avLst/>
+          </a:prstGeom>
+        </p:spPr>
+        <p:txBody>
+          <a:bodyPr wrap="none">
+            <a:spAutoFit/>
+          </a:bodyPr>
+          <a:lstStyle/>
+          <a:p>
+            <a:r>
+              <a:rPr lang="en-US" dirty="0" err="1">
+                <a:solidFill>
+                  <a:srgbClr val="FF0000"/>
+                </a:solidFill>
+                <a:latin typeface="Calibri" panose="020F0502020204030204" pitchFamily="34" charset="0"/>
+                <a:cs typeface="Calibri" panose="020F0502020204030204" pitchFamily="34" charset="0"/>
+                <a:sym typeface="Wingdings" pitchFamily="2" charset="2"/>
+              </a:rPr>
+              <a:t>mJJ</a:t>
+            </a:r>
+            <a:r>
+              <a:rPr lang="en-US" dirty="0">
+                <a:solidFill>
+                  <a:srgbClr val="FF0000"/>
+                </a:solidFill>
+                <a:latin typeface="Calibri" panose="020F0502020204030204" pitchFamily="34" charset="0"/>
+                <a:cs typeface="Calibri" panose="020F0502020204030204" pitchFamily="34" charset="0"/>
+                <a:sym typeface="Wingdings" pitchFamily="2" charset="2"/>
+              </a:rPr>
+              <a:t> &gt; 1.5 </a:t>
+            </a:r>
+            <a:r>
+              <a:rPr lang="en-US" dirty="0" err="1">
+                <a:solidFill>
+                  <a:srgbClr val="FF0000"/>
+                </a:solidFill>
+                <a:latin typeface="Calibri" panose="020F0502020204030204" pitchFamily="34" charset="0"/>
+                <a:cs typeface="Calibri" panose="020F0502020204030204" pitchFamily="34" charset="0"/>
+                <a:sym typeface="Wingdings" pitchFamily="2" charset="2"/>
+              </a:rPr>
+              <a:t>TeV</a:t>
+            </a:r>
+            <a:r>
+              <a:rPr lang="en-US" dirty="0">
+                <a:solidFill>
+                  <a:srgbClr val="FF0000"/>
+                </a:solidFill>
+                <a:latin typeface="Calibri" panose="020F0502020204030204" pitchFamily="34" charset="0"/>
+                <a:cs typeface="Calibri" panose="020F0502020204030204" pitchFamily="34" charset="0"/>
+                <a:sym typeface="Wingdings" pitchFamily="2" charset="2"/>
+              </a:rPr>
+              <a:t> </a:t>
+            </a:r>
+          </a:p>
+        </p:txBody>
+      </p:sp>
+      <p:pic>
+        <p:nvPicPr>
+          <p:cNvPr id="14" name="Picture 13">
+            <a:extLst>
+              <a:ext uri="{FF2B5EF4-FFF2-40B4-BE49-F238E27FC236}">
+                <a16:creationId xmlns:a16="http://schemas.microsoft.com/office/drawing/2014/main" id="{A82FFE0C-7DD3-2848-AA17-447D7871BC1F}"/>
+              </a:ext>
+            </a:extLst>
+          </p:cNvPr>
+          <p:cNvPicPr>
+            <a:picLocks noChangeAspect="1"/>
+          </p:cNvPicPr>
+          <p:nvPr/>
+        </p:nvPicPr>
+        <p:blipFill>
+          <a:blip r:embed="rId2"/>
+          <a:stretch>
+            <a:fillRect/>
+          </a:stretch>
+        </p:blipFill>
+        <p:spPr>
+          <a:xfrm rot="5400000">
+            <a:off x="6809486" y="440624"/>
+            <a:ext cx="4311269" cy="5976747"/>
+          </a:xfrm>
+          <a:prstGeom prst="rect">
+            <a:avLst/>
+          </a:prstGeom>
+        </p:spPr>
+      </p:pic>
+      <p:pic>
+        <p:nvPicPr>
+          <p:cNvPr id="16" name="Picture 15">
+            <a:extLst>
+              <a:ext uri="{FF2B5EF4-FFF2-40B4-BE49-F238E27FC236}">
+                <a16:creationId xmlns:a16="http://schemas.microsoft.com/office/drawing/2014/main" id="{F9A6F128-8EEF-6F4E-B43C-0C0D656037BF}"/>
+              </a:ext>
+            </a:extLst>
+          </p:cNvPr>
+          <p:cNvPicPr>
+            <a:picLocks noChangeAspect="1"/>
+          </p:cNvPicPr>
+          <p:nvPr/>
+        </p:nvPicPr>
+        <p:blipFill>
+          <a:blip r:embed="rId3"/>
+          <a:stretch>
+            <a:fillRect/>
+          </a:stretch>
+        </p:blipFill>
+        <p:spPr>
+          <a:xfrm rot="5400000">
+            <a:off x="832739" y="440625"/>
+            <a:ext cx="4311269" cy="5976747"/>
+          </a:xfrm>
+          <a:prstGeom prst="rect">
+            <a:avLst/>
+          </a:prstGeom>
+        </p:spPr>
+      </p:pic>
     </p:spTree>
     <p:extLst>
       <p:ext uri="{BB962C8B-B14F-4D97-AF65-F5344CB8AC3E}">
-        <p14:creationId xmlns:p14="http://schemas.microsoft.com/office/powerpoint/2010/main" val="3913691451"/>
+        <p14:creationId xmlns:p14="http://schemas.microsoft.com/office/powerpoint/2010/main" val="1376621293"/>
       </p:ext>
     </p:extLst>
   </p:cSld>
@@ -12895,8 +14558,8 @@
         </p:nvSpPr>
         <p:spPr>
           <a:xfrm>
-            <a:off x="835793" y="2828018"/>
-            <a:ext cx="10520413" cy="600982"/>
+            <a:off x="833491" y="-26870"/>
+            <a:ext cx="10520413" cy="481238"/>
           </a:xfrm>
           <a:prstGeom prst="rect">
             <a:avLst/>
@@ -12932,7 +14595,360 @@
             <a:pPr algn="ctr"/>
             <a:r>
               <a:rPr lang="en-GB" sz="2800" u="sng" dirty="0"/>
-              <a:t>BACKUP</a:t>
+              <a:t>Angular Distributions (</a:t>
+            </a:r>
+            <a:r>
+              <a:rPr lang="en-GB" sz="2800" u="sng" dirty="0" err="1"/>
+              <a:t>Prefit</a:t>
+            </a:r>
+            <a:r>
+              <a:rPr lang="en-GB" sz="2800" u="sng" dirty="0"/>
+              <a:t>)</a:t>
+            </a:r>
+            <a:endParaRPr lang="en-GB" sz="2800" u="sng" dirty="0">
+              <a:solidFill>
+                <a:srgbClr val="FF0000"/>
+              </a:solidFill>
+            </a:endParaRPr>
+          </a:p>
+        </p:txBody>
+      </p:sp>
+      <p:sp>
+        <p:nvSpPr>
+          <p:cNvPr id="21" name="TextBox 20">
+            <a:extLst>
+              <a:ext uri="{FF2B5EF4-FFF2-40B4-BE49-F238E27FC236}">
+                <a16:creationId xmlns:a16="http://schemas.microsoft.com/office/drawing/2014/main" id="{F428E97F-E442-F14E-9CB9-B30F346A9D76}"/>
+              </a:ext>
+            </a:extLst>
+          </p:cNvPr>
+          <p:cNvSpPr txBox="1"/>
+          <p:nvPr/>
+        </p:nvSpPr>
+        <p:spPr>
+          <a:xfrm>
+            <a:off x="0" y="1690657"/>
+            <a:ext cx="2023672" cy="369332"/>
+          </a:xfrm>
+          <a:prstGeom prst="rect">
+            <a:avLst/>
+          </a:prstGeom>
+          <a:noFill/>
+        </p:spPr>
+        <p:txBody>
+          <a:bodyPr wrap="square" rtlCol="0">
+            <a:spAutoFit/>
+          </a:bodyPr>
+          <a:lstStyle/>
+          <a:p>
+            <a:r>
+              <a:rPr lang="en-GR" dirty="0">
+                <a:solidFill>
+                  <a:srgbClr val="FF0000"/>
+                </a:solidFill>
+              </a:rPr>
+              <a:t>M</a:t>
+            </a:r>
+            <a:r>
+              <a:rPr lang="en-GR" baseline="-25000" dirty="0">
+                <a:solidFill>
+                  <a:srgbClr val="FF0000"/>
+                </a:solidFill>
+              </a:rPr>
+              <a:t>z’ </a:t>
+            </a:r>
+            <a:r>
+              <a:rPr lang="en-GR" dirty="0">
+                <a:solidFill>
+                  <a:srgbClr val="FF0000"/>
+                </a:solidFill>
+              </a:rPr>
+              <a:t>=2000, w = 1%</a:t>
+            </a:r>
+          </a:p>
+        </p:txBody>
+      </p:sp>
+      <p:sp>
+        <p:nvSpPr>
+          <p:cNvPr id="22" name="TextBox 21">
+            <a:extLst>
+              <a:ext uri="{FF2B5EF4-FFF2-40B4-BE49-F238E27FC236}">
+                <a16:creationId xmlns:a16="http://schemas.microsoft.com/office/drawing/2014/main" id="{604C635C-AFB0-6A45-A110-C274ACEF6636}"/>
+              </a:ext>
+            </a:extLst>
+          </p:cNvPr>
+          <p:cNvSpPr txBox="1"/>
+          <p:nvPr/>
+        </p:nvSpPr>
+        <p:spPr>
+          <a:xfrm>
+            <a:off x="-60194" y="4668000"/>
+            <a:ext cx="2023672" cy="369332"/>
+          </a:xfrm>
+          <a:prstGeom prst="rect">
+            <a:avLst/>
+          </a:prstGeom>
+          <a:noFill/>
+        </p:spPr>
+        <p:txBody>
+          <a:bodyPr wrap="square" rtlCol="0">
+            <a:spAutoFit/>
+          </a:bodyPr>
+          <a:lstStyle/>
+          <a:p>
+            <a:r>
+              <a:rPr lang="en-GR" dirty="0">
+                <a:solidFill>
+                  <a:srgbClr val="FF0000"/>
+                </a:solidFill>
+              </a:rPr>
+              <a:t>M</a:t>
+            </a:r>
+            <a:r>
+              <a:rPr lang="en-GR" baseline="-25000" dirty="0">
+                <a:solidFill>
+                  <a:srgbClr val="FF0000"/>
+                </a:solidFill>
+              </a:rPr>
+              <a:t>z’ </a:t>
+            </a:r>
+            <a:r>
+              <a:rPr lang="en-GR" dirty="0">
+                <a:solidFill>
+                  <a:srgbClr val="FF0000"/>
+                </a:solidFill>
+              </a:rPr>
+              <a:t>=2000, w = 10%</a:t>
+            </a:r>
+          </a:p>
+        </p:txBody>
+      </p:sp>
+      <p:pic>
+        <p:nvPicPr>
+          <p:cNvPr id="30" name="Picture 29">
+            <a:extLst>
+              <a:ext uri="{FF2B5EF4-FFF2-40B4-BE49-F238E27FC236}">
+                <a16:creationId xmlns:a16="http://schemas.microsoft.com/office/drawing/2014/main" id="{33389B78-19A3-AF48-BB39-B5265FD3E59F}"/>
+              </a:ext>
+            </a:extLst>
+          </p:cNvPr>
+          <p:cNvPicPr>
+            <a:picLocks noChangeAspect="1"/>
+          </p:cNvPicPr>
+          <p:nvPr/>
+        </p:nvPicPr>
+        <p:blipFill>
+          <a:blip r:embed="rId2"/>
+          <a:stretch>
+            <a:fillRect/>
+          </a:stretch>
+        </p:blipFill>
+        <p:spPr>
+          <a:xfrm rot="5400000">
+            <a:off x="2490468" y="-163182"/>
+            <a:ext cx="3012694" cy="4176522"/>
+          </a:xfrm>
+          <a:prstGeom prst="rect">
+            <a:avLst/>
+          </a:prstGeom>
+        </p:spPr>
+      </p:pic>
+      <p:pic>
+        <p:nvPicPr>
+          <p:cNvPr id="32" name="Picture 31">
+            <a:extLst>
+              <a:ext uri="{FF2B5EF4-FFF2-40B4-BE49-F238E27FC236}">
+                <a16:creationId xmlns:a16="http://schemas.microsoft.com/office/drawing/2014/main" id="{5D8FCECC-B092-1145-A40C-668FCF972B04}"/>
+              </a:ext>
+            </a:extLst>
+          </p:cNvPr>
+          <p:cNvPicPr>
+            <a:picLocks noChangeAspect="1"/>
+          </p:cNvPicPr>
+          <p:nvPr/>
+        </p:nvPicPr>
+        <p:blipFill>
+          <a:blip r:embed="rId3"/>
+          <a:stretch>
+            <a:fillRect/>
+          </a:stretch>
+        </p:blipFill>
+        <p:spPr>
+          <a:xfrm rot="5400000">
+            <a:off x="2560616" y="2849512"/>
+            <a:ext cx="3012694" cy="4176522"/>
+          </a:xfrm>
+          <a:prstGeom prst="rect">
+            <a:avLst/>
+          </a:prstGeom>
+        </p:spPr>
+      </p:pic>
+      <p:pic>
+        <p:nvPicPr>
+          <p:cNvPr id="34" name="Picture 33">
+            <a:extLst>
+              <a:ext uri="{FF2B5EF4-FFF2-40B4-BE49-F238E27FC236}">
+                <a16:creationId xmlns:a16="http://schemas.microsoft.com/office/drawing/2014/main" id="{71F63830-BE8F-704E-B514-1B2C416ABA64}"/>
+              </a:ext>
+            </a:extLst>
+          </p:cNvPr>
+          <p:cNvPicPr>
+            <a:picLocks noChangeAspect="1"/>
+          </p:cNvPicPr>
+          <p:nvPr/>
+        </p:nvPicPr>
+        <p:blipFill>
+          <a:blip r:embed="rId4"/>
+          <a:stretch>
+            <a:fillRect/>
+          </a:stretch>
+        </p:blipFill>
+        <p:spPr>
+          <a:xfrm rot="5400000">
+            <a:off x="6712542" y="-168034"/>
+            <a:ext cx="3012694" cy="4176522"/>
+          </a:xfrm>
+          <a:prstGeom prst="rect">
+            <a:avLst/>
+          </a:prstGeom>
+        </p:spPr>
+      </p:pic>
+      <p:pic>
+        <p:nvPicPr>
+          <p:cNvPr id="36" name="Picture 35">
+            <a:extLst>
+              <a:ext uri="{FF2B5EF4-FFF2-40B4-BE49-F238E27FC236}">
+                <a16:creationId xmlns:a16="http://schemas.microsoft.com/office/drawing/2014/main" id="{C9E14ED7-5142-2547-B691-73DADC555841}"/>
+              </a:ext>
+            </a:extLst>
+          </p:cNvPr>
+          <p:cNvPicPr>
+            <a:picLocks noChangeAspect="1"/>
+          </p:cNvPicPr>
+          <p:nvPr/>
+        </p:nvPicPr>
+        <p:blipFill>
+          <a:blip r:embed="rId5"/>
+          <a:stretch>
+            <a:fillRect/>
+          </a:stretch>
+        </p:blipFill>
+        <p:spPr>
+          <a:xfrm rot="5400000">
+            <a:off x="6722148" y="2849512"/>
+            <a:ext cx="3012694" cy="4176522"/>
+          </a:xfrm>
+          <a:prstGeom prst="rect">
+            <a:avLst/>
+          </a:prstGeom>
+        </p:spPr>
+      </p:pic>
+      <p:sp>
+        <p:nvSpPr>
+          <p:cNvPr id="23" name="TextBox 22">
+            <a:extLst>
+              <a:ext uri="{FF2B5EF4-FFF2-40B4-BE49-F238E27FC236}">
+                <a16:creationId xmlns:a16="http://schemas.microsoft.com/office/drawing/2014/main" id="{7328C7EA-20B2-594C-95E0-5D0A7AB50953}"/>
+              </a:ext>
+            </a:extLst>
+          </p:cNvPr>
+          <p:cNvSpPr txBox="1"/>
+          <p:nvPr/>
+        </p:nvSpPr>
+        <p:spPr>
+          <a:xfrm>
+            <a:off x="10258268" y="1690657"/>
+            <a:ext cx="2023672" cy="369332"/>
+          </a:xfrm>
+          <a:prstGeom prst="rect">
+            <a:avLst/>
+          </a:prstGeom>
+          <a:noFill/>
+        </p:spPr>
+        <p:txBody>
+          <a:bodyPr wrap="square" rtlCol="0">
+            <a:spAutoFit/>
+          </a:bodyPr>
+          <a:lstStyle/>
+          <a:p>
+            <a:r>
+              <a:rPr lang="en-GR" dirty="0">
+                <a:solidFill>
+                  <a:srgbClr val="FF0000"/>
+                </a:solidFill>
+              </a:rPr>
+              <a:t>M</a:t>
+            </a:r>
+            <a:r>
+              <a:rPr lang="en-GR" baseline="-25000" dirty="0">
+                <a:solidFill>
+                  <a:srgbClr val="FF0000"/>
+                </a:solidFill>
+              </a:rPr>
+              <a:t>z’ </a:t>
+            </a:r>
+            <a:r>
+              <a:rPr lang="en-GR" dirty="0">
+                <a:solidFill>
+                  <a:srgbClr val="FF0000"/>
+                </a:solidFill>
+              </a:rPr>
+              <a:t>=2500, w = 1%</a:t>
+            </a:r>
+          </a:p>
+        </p:txBody>
+      </p:sp>
+      <p:sp>
+        <p:nvSpPr>
+          <p:cNvPr id="24" name="TextBox 23">
+            <a:extLst>
+              <a:ext uri="{FF2B5EF4-FFF2-40B4-BE49-F238E27FC236}">
+                <a16:creationId xmlns:a16="http://schemas.microsoft.com/office/drawing/2014/main" id="{2F899BD0-5148-EE45-9F57-F54E80881C8C}"/>
+              </a:ext>
+            </a:extLst>
+          </p:cNvPr>
+          <p:cNvSpPr txBox="1"/>
+          <p:nvPr/>
+        </p:nvSpPr>
+        <p:spPr>
+          <a:xfrm>
+            <a:off x="10258268" y="4668000"/>
+            <a:ext cx="2023672" cy="369332"/>
+          </a:xfrm>
+          <a:prstGeom prst="rect">
+            <a:avLst/>
+          </a:prstGeom>
+          <a:noFill/>
+        </p:spPr>
+        <p:txBody>
+          <a:bodyPr wrap="square" rtlCol="0">
+            <a:spAutoFit/>
+          </a:bodyPr>
+          <a:lstStyle/>
+          <a:p>
+            <a:r>
+              <a:rPr lang="en-GR" dirty="0">
+                <a:solidFill>
+                  <a:srgbClr val="FF0000"/>
+                </a:solidFill>
+              </a:rPr>
+              <a:t>M</a:t>
+            </a:r>
+            <a:r>
+              <a:rPr lang="en-GR" baseline="-25000" dirty="0">
+                <a:solidFill>
+                  <a:srgbClr val="FF0000"/>
+                </a:solidFill>
+              </a:rPr>
+              <a:t>z’ </a:t>
+            </a:r>
+            <a:r>
+              <a:rPr lang="en-GR" dirty="0">
+                <a:solidFill>
+                  <a:srgbClr val="FF0000"/>
+                </a:solidFill>
+              </a:rPr>
+              <a:t>=2500, w = 10%</a:t>
             </a:r>
           </a:p>
         </p:txBody>
@@ -12940,7 +14956,7 @@
     </p:spTree>
     <p:extLst>
       <p:ext uri="{BB962C8B-B14F-4D97-AF65-F5344CB8AC3E}">
-        <p14:creationId xmlns:p14="http://schemas.microsoft.com/office/powerpoint/2010/main" val="1485357141"/>
+        <p14:creationId xmlns:p14="http://schemas.microsoft.com/office/powerpoint/2010/main" val="4083330330"/>
       </p:ext>
     </p:extLst>
   </p:cSld>
@@ -12969,7 +14985,13 @@
       </p:grpSpPr>
       <p:sp>
         <p:nvSpPr>
-          <p:cNvPr id="3" name="Footer Placeholder 2"/>
+          <p:cNvPr id="11" name="Footer Placeholder 7">
+            <a:extLst>
+              <a:ext uri="{FF2B5EF4-FFF2-40B4-BE49-F238E27FC236}">
+                <a16:creationId xmlns:a16="http://schemas.microsoft.com/office/drawing/2014/main" id="{59E26047-BD3C-504E-B955-20FE5C8AA1AA}"/>
+              </a:ext>
+            </a:extLst>
+          </p:cNvPr>
           <p:cNvSpPr>
             <a:spLocks noGrp="1"/>
           </p:cNvSpPr>
@@ -12977,7 +14999,12 @@
             <p:ph type="ftr" sz="quarter" idx="11"/>
           </p:nvPr>
         </p:nvSpPr>
-        <p:spPr/>
+        <p:spPr>
+          <a:xfrm>
+            <a:off x="3686185" y="6459785"/>
+            <a:ext cx="4822804" cy="365125"/>
+          </a:xfrm>
+        </p:spPr>
         <p:txBody>
           <a:bodyPr/>
           <a:lstStyle/>
@@ -12996,10 +15023,111 @@
       </p:sp>
       <p:sp>
         <p:nvSpPr>
-          <p:cNvPr id="6" name="TextBox 5">
+          <p:cNvPr id="2" name="Slide Number Placeholder 1">
             <a:extLst>
               <a:ext uri="{FF2B5EF4-FFF2-40B4-BE49-F238E27FC236}">
-                <a16:creationId xmlns:a16="http://schemas.microsoft.com/office/drawing/2014/main" id="{1DDE6F7F-FC19-F840-A70E-C84BA99E0247}"/>
+                <a16:creationId xmlns:a16="http://schemas.microsoft.com/office/drawing/2014/main" id="{AA422B14-CFD2-DA45-ABB4-F85273D6A99E}"/>
+              </a:ext>
+            </a:extLst>
+          </p:cNvPr>
+          <p:cNvSpPr>
+            <a:spLocks noGrp="1"/>
+          </p:cNvSpPr>
+          <p:nvPr>
+            <p:ph type="sldNum" sz="quarter" idx="12"/>
+          </p:nvPr>
+        </p:nvSpPr>
+        <p:spPr/>
+        <p:txBody>
+          <a:bodyPr/>
+          <a:lstStyle/>
+          <a:p>
+            <a:fld id="{4FAB73BC-B049-4115-A692-8D63A059BFB8}" type="slidenum">
+              <a:rPr lang="en-US" smtClean="0"/>
+              <a:pPr/>
+              <a:t>9</a:t>
+            </a:fld>
+            <a:endParaRPr lang="en-US" dirty="0"/>
+          </a:p>
+        </p:txBody>
+      </p:sp>
+      <p:sp>
+        <p:nvSpPr>
+          <p:cNvPr id="7" name="Title 4">
+            <a:extLst>
+              <a:ext uri="{FF2B5EF4-FFF2-40B4-BE49-F238E27FC236}">
+                <a16:creationId xmlns:a16="http://schemas.microsoft.com/office/drawing/2014/main" id="{17B766C6-A25E-7846-9053-B6684037C65A}"/>
+              </a:ext>
+            </a:extLst>
+          </p:cNvPr>
+          <p:cNvSpPr txBox="1">
+            <a:spLocks/>
+          </p:cNvSpPr>
+          <p:nvPr/>
+        </p:nvSpPr>
+        <p:spPr>
+          <a:xfrm>
+            <a:off x="833491" y="-26870"/>
+            <a:ext cx="10520413" cy="481238"/>
+          </a:xfrm>
+          <a:prstGeom prst="rect">
+            <a:avLst/>
+          </a:prstGeom>
+        </p:spPr>
+        <p:txBody>
+          <a:bodyPr vert="horz" lIns="91440" tIns="45720" rIns="91440" bIns="45720" rtlCol="0" anchor="b">
+            <a:noAutofit/>
+          </a:bodyPr>
+          <a:lstStyle>
+            <a:lvl1pPr algn="l" defTabSz="914400" rtl="0" eaLnBrk="1" latinLnBrk="0" hangingPunct="1">
+              <a:lnSpc>
+                <a:spcPct val="85000"/>
+              </a:lnSpc>
+              <a:spcBef>
+                <a:spcPct val="0"/>
+              </a:spcBef>
+              <a:buNone/>
+              <a:defRPr sz="4800" kern="1200" spc="-50" baseline="0">
+                <a:solidFill>
+                  <a:schemeClr val="tx1">
+                    <a:lumMod val="75000"/>
+                    <a:lumOff val="25000"/>
+                  </a:schemeClr>
+                </a:solidFill>
+                <a:latin typeface="+mj-lt"/>
+                <a:ea typeface="+mj-ea"/>
+                <a:cs typeface="+mj-cs"/>
+              </a:defRPr>
+            </a:lvl1pPr>
+          </a:lstStyle>
+          <a:p>
+            <a:pPr algn="ctr"/>
+            <a:r>
+              <a:rPr lang="en-GB" sz="2800" u="sng" dirty="0"/>
+              <a:t>Angular Distributions (</a:t>
+            </a:r>
+            <a:r>
+              <a:rPr lang="en-GB" sz="2800" u="sng" dirty="0" err="1"/>
+              <a:t>PostFit</a:t>
+            </a:r>
+            <a:r>
+              <a:rPr lang="en-GB" sz="2800" u="sng" dirty="0"/>
+              <a:t>)</a:t>
+            </a:r>
+            <a:endParaRPr lang="en-GB" sz="2800" u="sng" dirty="0">
+              <a:solidFill>
+                <a:srgbClr val="FF0000"/>
+              </a:solidFill>
+            </a:endParaRPr>
+          </a:p>
+        </p:txBody>
+      </p:sp>
+      <p:sp>
+        <p:nvSpPr>
+          <p:cNvPr id="21" name="TextBox 20">
+            <a:extLst>
+              <a:ext uri="{FF2B5EF4-FFF2-40B4-BE49-F238E27FC236}">
+                <a16:creationId xmlns:a16="http://schemas.microsoft.com/office/drawing/2014/main" id="{F428E97F-E442-F14E-9CB9-B30F346A9D76}"/>
               </a:ext>
             </a:extLst>
           </p:cNvPr>
@@ -13008,8 +15136,8 @@
         </p:nvSpPr>
         <p:spPr>
           <a:xfrm>
-            <a:off x="2574438" y="65430"/>
-            <a:ext cx="1990226" cy="430887"/>
+            <a:off x="0" y="1690657"/>
+            <a:ext cx="2023672" cy="369332"/>
           </a:xfrm>
           <a:prstGeom prst="rect">
             <a:avLst/>
@@ -13023,1036 +15151,38 @@
           <a:lstStyle/>
           <a:p>
             <a:r>
-              <a:rPr lang="en-US" sz="2200" dirty="0">
+              <a:rPr lang="en-GR" dirty="0">
                 <a:solidFill>
-                  <a:srgbClr val="00B050"/>
+                  <a:srgbClr val="FF0000"/>
                 </a:solidFill>
-                <a:sym typeface="Wingdings" pitchFamily="2" charset="2"/>
               </a:rPr>
-              <a:t>Signal Selection</a:t>
-            </a:r>
-          </a:p>
-        </p:txBody>
-      </p:sp>
-      <p:sp>
-        <p:nvSpPr>
-          <p:cNvPr id="5" name="Slide Number Placeholder 4">
+              <a:t>M</a:t>
+            </a:r>
+            <a:r>
+              <a:rPr lang="en-GR" baseline="-25000" dirty="0">
+                <a:solidFill>
+                  <a:srgbClr val="FF0000"/>
+                </a:solidFill>
+              </a:rPr>
+              <a:t>z’ </a:t>
+            </a:r>
+            <a:r>
+              <a:rPr lang="en-GR" dirty="0">
+                <a:solidFill>
+                  <a:srgbClr val="FF0000"/>
+                </a:solidFill>
+              </a:rPr>
+              <a:t>=2000, w = 1%</a:t>
+            </a:r>
+          </a:p>
+        </p:txBody>
+      </p:sp>
+      <p:sp>
+        <p:nvSpPr>
+          <p:cNvPr id="22" name="TextBox 21">
             <a:extLst>
               <a:ext uri="{FF2B5EF4-FFF2-40B4-BE49-F238E27FC236}">
-                <a16:creationId xmlns:a16="http://schemas.microsoft.com/office/drawing/2014/main" id="{69A96869-DB60-5345-ACD9-F1C41035B064}"/>
-              </a:ext>
-            </a:extLst>
-          </p:cNvPr>
-          <p:cNvSpPr>
-            <a:spLocks noGrp="1"/>
-          </p:cNvSpPr>
-          <p:nvPr>
-            <p:ph type="sldNum" sz="quarter" idx="12"/>
-          </p:nvPr>
-        </p:nvSpPr>
-        <p:spPr/>
-        <p:txBody>
-          <a:bodyPr/>
-          <a:lstStyle/>
-          <a:p>
-            <a:fld id="{4FAB73BC-B049-4115-A692-8D63A059BFB8}" type="slidenum">
-              <a:rPr lang="en-US" smtClean="0"/>
-              <a:pPr/>
-              <a:t>9</a:t>
-            </a:fld>
-            <a:endParaRPr lang="en-US" dirty="0"/>
-          </a:p>
-        </p:txBody>
-      </p:sp>
-      <p:sp>
-        <p:nvSpPr>
-          <p:cNvPr id="24" name="Date Placeholder 23">
-            <a:extLst>
-              <a:ext uri="{FF2B5EF4-FFF2-40B4-BE49-F238E27FC236}">
-                <a16:creationId xmlns:a16="http://schemas.microsoft.com/office/drawing/2014/main" id="{056D71EF-2E89-4043-8F92-90A4D46A3E69}"/>
-              </a:ext>
-            </a:extLst>
-          </p:cNvPr>
-          <p:cNvSpPr>
-            <a:spLocks noGrp="1"/>
-          </p:cNvSpPr>
-          <p:nvPr>
-            <p:ph type="dt" sz="half" idx="10"/>
-          </p:nvPr>
-        </p:nvSpPr>
-        <p:spPr/>
-        <p:txBody>
-          <a:bodyPr/>
-          <a:lstStyle/>
-          <a:p>
-            <a:fld id="{F7AFF6A5-F1FB-284A-BF72-2836D5A0B341}" type="datetime1">
-              <a:rPr lang="en-US" smtClean="0"/>
-              <a:t>10/28/20</a:t>
-            </a:fld>
-            <a:endParaRPr lang="en-US" dirty="0"/>
-          </a:p>
-        </p:txBody>
-      </p:sp>
-      <p:graphicFrame>
-        <p:nvGraphicFramePr>
-          <p:cNvPr id="4" name="Table 3">
-            <a:extLst>
-              <a:ext uri="{FF2B5EF4-FFF2-40B4-BE49-F238E27FC236}">
-                <a16:creationId xmlns:a16="http://schemas.microsoft.com/office/drawing/2014/main" id="{9FB11E00-21A0-484F-B127-1B964919B378}"/>
-              </a:ext>
-            </a:extLst>
-          </p:cNvPr>
-          <p:cNvGraphicFramePr>
-            <a:graphicFrameLocks noGrp="1"/>
-          </p:cNvGraphicFramePr>
-          <p:nvPr/>
-        </p:nvGraphicFramePr>
-        <p:xfrm>
-          <a:off x="1348101" y="557850"/>
-          <a:ext cx="4368118" cy="5455057"/>
-        </p:xfrm>
-        <a:graphic>
-          <a:graphicData uri="http://schemas.openxmlformats.org/drawingml/2006/table">
-            <a:tbl>
-              <a:tblPr firstRow="1" bandRow="1">
-                <a:tableStyleId>{46F890A9-2807-4EBB-B81D-B2AA78EC7F39}</a:tableStyleId>
-              </a:tblPr>
-              <a:tblGrid>
-                <a:gridCol w="2184059">
-                  <a:extLst>
-                    <a:ext uri="{9D8B030D-6E8A-4147-A177-3AD203B41FA5}">
-                      <a16:colId xmlns:a16="http://schemas.microsoft.com/office/drawing/2014/main" val="3731337435"/>
-                    </a:ext>
-                  </a:extLst>
-                </a:gridCol>
-                <a:gridCol w="2184059">
-                  <a:extLst>
-                    <a:ext uri="{9D8B030D-6E8A-4147-A177-3AD203B41FA5}">
-                      <a16:colId xmlns:a16="http://schemas.microsoft.com/office/drawing/2014/main" val="3688698510"/>
-                    </a:ext>
-                  </a:extLst>
-                </a:gridCol>
-              </a:tblGrid>
-              <a:tr h="462602">
-                <a:tc>
-                  <a:txBody>
-                    <a:bodyPr/>
-                    <a:lstStyle/>
-                    <a:p>
-                      <a:pPr algn="ctr"/>
-                      <a:r>
-                        <a:rPr lang="en-GR" dirty="0"/>
-                        <a:t>Variables</a:t>
-                      </a:r>
-                    </a:p>
-                  </a:txBody>
-                  <a:tcPr/>
-                </a:tc>
-                <a:tc>
-                  <a:txBody>
-                    <a:bodyPr/>
-                    <a:lstStyle/>
-                    <a:p>
-                      <a:pPr algn="ctr"/>
-                      <a:r>
-                        <a:rPr lang="en-GR" dirty="0"/>
-                        <a:t>Selected Cut</a:t>
-                      </a:r>
-                    </a:p>
-                  </a:txBody>
-                  <a:tcPr/>
-                </a:tc>
-                <a:extLst>
-                  <a:ext uri="{0D108BD9-81ED-4DB2-BD59-A6C34878D82A}">
-                    <a16:rowId xmlns:a16="http://schemas.microsoft.com/office/drawing/2014/main" val="1233017762"/>
-                  </a:ext>
-                </a:extLst>
-              </a:tr>
-              <a:tr h="462602">
-                <a:tc>
-                  <a:txBody>
-                    <a:bodyPr/>
-                    <a:lstStyle/>
-                    <a:p>
-                      <a:pPr algn="ctr"/>
-                      <a:r>
-                        <a:rPr lang="en-GR" dirty="0"/>
-                        <a:t>pT (both leading jets) </a:t>
-                      </a:r>
-                    </a:p>
-                  </a:txBody>
-                  <a:tcPr/>
-                </a:tc>
-                <a:tc>
-                  <a:txBody>
-                    <a:bodyPr/>
-                    <a:lstStyle/>
-                    <a:p>
-                      <a:pPr algn="ctr"/>
-                      <a:r>
-                        <a:rPr lang="en-GR" dirty="0"/>
-                        <a:t>&gt; 400 GeV</a:t>
-                      </a:r>
-                    </a:p>
-                  </a:txBody>
-                  <a:tcPr/>
-                </a:tc>
-                <a:extLst>
-                  <a:ext uri="{0D108BD9-81ED-4DB2-BD59-A6C34878D82A}">
-                    <a16:rowId xmlns:a16="http://schemas.microsoft.com/office/drawing/2014/main" val="1455770781"/>
-                  </a:ext>
-                </a:extLst>
-              </a:tr>
-              <a:tr h="462602">
-                <a:tc>
-                  <a:txBody>
-                    <a:bodyPr/>
-                    <a:lstStyle/>
-                    <a:p>
-                      <a:pPr algn="ctr"/>
-                      <a:r>
-                        <a:rPr lang="en-GR" dirty="0"/>
-                        <a:t>Njets </a:t>
-                      </a:r>
-                    </a:p>
-                  </a:txBody>
-                  <a:tcPr/>
-                </a:tc>
-                <a:tc>
-                  <a:txBody>
-                    <a:bodyPr/>
-                    <a:lstStyle/>
-                    <a:p>
-                      <a:pPr algn="ctr"/>
-                      <a:r>
-                        <a:rPr lang="en-GR" dirty="0"/>
-                        <a:t>&gt; 1</a:t>
-                      </a:r>
-                    </a:p>
-                  </a:txBody>
-                  <a:tcPr/>
-                </a:tc>
-                <a:extLst>
-                  <a:ext uri="{0D108BD9-81ED-4DB2-BD59-A6C34878D82A}">
-                    <a16:rowId xmlns:a16="http://schemas.microsoft.com/office/drawing/2014/main" val="4073963215"/>
-                  </a:ext>
-                </a:extLst>
-              </a:tr>
-              <a:tr h="462602">
-                <a:tc>
-                  <a:txBody>
-                    <a:bodyPr/>
-                    <a:lstStyle/>
-                    <a:p>
-                      <a:pPr algn="ctr"/>
-                      <a:r>
-                        <a:rPr lang="en-GR" dirty="0"/>
-                        <a:t>N leptons</a:t>
-                      </a:r>
-                    </a:p>
-                  </a:txBody>
-                  <a:tcPr/>
-                </a:tc>
-                <a:tc>
-                  <a:txBody>
-                    <a:bodyPr/>
-                    <a:lstStyle/>
-                    <a:p>
-                      <a:pPr algn="ctr"/>
-                      <a:r>
-                        <a:rPr lang="en-GR" dirty="0"/>
-                        <a:t>= 0</a:t>
-                      </a:r>
-                    </a:p>
-                  </a:txBody>
-                  <a:tcPr/>
-                </a:tc>
-                <a:extLst>
-                  <a:ext uri="{0D108BD9-81ED-4DB2-BD59-A6C34878D82A}">
-                    <a16:rowId xmlns:a16="http://schemas.microsoft.com/office/drawing/2014/main" val="1636792577"/>
-                  </a:ext>
-                </a:extLst>
-              </a:tr>
-              <a:tr h="581727">
-                <a:tc>
-                  <a:txBody>
-                    <a:bodyPr/>
-                    <a:lstStyle/>
-                    <a:p>
-                      <a:pPr algn="ctr"/>
-                      <a:r>
-                        <a:rPr lang="en-GR" dirty="0"/>
-                        <a:t>|eta| (both leading jets)</a:t>
-                      </a:r>
-                    </a:p>
-                  </a:txBody>
-                  <a:tcPr/>
-                </a:tc>
-                <a:tc>
-                  <a:txBody>
-                    <a:bodyPr/>
-                    <a:lstStyle/>
-                    <a:p>
-                      <a:pPr algn="ctr"/>
-                      <a:r>
-                        <a:rPr lang="en-GR" dirty="0"/>
-                        <a:t>&lt; 2.4</a:t>
-                      </a:r>
-                    </a:p>
-                  </a:txBody>
-                  <a:tcPr/>
-                </a:tc>
-                <a:extLst>
-                  <a:ext uri="{0D108BD9-81ED-4DB2-BD59-A6C34878D82A}">
-                    <a16:rowId xmlns:a16="http://schemas.microsoft.com/office/drawing/2014/main" val="2646382854"/>
-                  </a:ext>
-                </a:extLst>
-              </a:tr>
-              <a:tr h="462602">
-                <a:tc>
-                  <a:txBody>
-                    <a:bodyPr/>
-                    <a:lstStyle/>
-                    <a:p>
-                      <a:pPr algn="ctr"/>
-                      <a:r>
-                        <a:rPr lang="en-GR" dirty="0"/>
-                        <a:t>mJJ</a:t>
-                      </a:r>
-                    </a:p>
-                  </a:txBody>
-                  <a:tcPr/>
-                </a:tc>
-                <a:tc>
-                  <a:txBody>
-                    <a:bodyPr/>
-                    <a:lstStyle/>
-                    <a:p>
-                      <a:pPr algn="ctr"/>
-                      <a:r>
-                        <a:rPr lang="en-GR" dirty="0"/>
-                        <a:t>&gt; 1000 GeV</a:t>
-                      </a:r>
-                    </a:p>
-                  </a:txBody>
-                  <a:tcPr/>
-                </a:tc>
-                <a:extLst>
-                  <a:ext uri="{0D108BD9-81ED-4DB2-BD59-A6C34878D82A}">
-                    <a16:rowId xmlns:a16="http://schemas.microsoft.com/office/drawing/2014/main" val="1717255047"/>
-                  </a:ext>
-                </a:extLst>
-              </a:tr>
-              <a:tr h="581727">
-                <a:tc>
-                  <a:txBody>
-                    <a:bodyPr/>
-                    <a:lstStyle/>
-                    <a:p>
-                      <a:pPr algn="ctr"/>
-                      <a:r>
-                        <a:rPr lang="en-GR" dirty="0"/>
-                        <a:t>jetMassSoftDrop (only for fit)</a:t>
-                      </a:r>
-                    </a:p>
-                  </a:txBody>
-                  <a:tcPr/>
-                </a:tc>
-                <a:tc>
-                  <a:txBody>
-                    <a:bodyPr/>
-                    <a:lstStyle/>
-                    <a:p>
-                      <a:pPr algn="ctr"/>
-                      <a:r>
-                        <a:rPr lang="en-GR" dirty="0"/>
-                        <a:t>(50,300) GeV</a:t>
-                      </a:r>
-                    </a:p>
-                  </a:txBody>
-                  <a:tcPr/>
-                </a:tc>
-                <a:extLst>
-                  <a:ext uri="{0D108BD9-81ED-4DB2-BD59-A6C34878D82A}">
-                    <a16:rowId xmlns:a16="http://schemas.microsoft.com/office/drawing/2014/main" val="4172697806"/>
-                  </a:ext>
-                </a:extLst>
-              </a:tr>
-              <a:tr h="581727">
-                <a:tc>
-                  <a:txBody>
-                    <a:bodyPr/>
-                    <a:lstStyle/>
-                    <a:p>
-                      <a:pPr marL="0" marR="0" lvl="0" indent="0" algn="ctr" defTabSz="914400" rtl="0" eaLnBrk="1" fontAlgn="auto" latinLnBrk="0" hangingPunct="1">
-                        <a:lnSpc>
-                          <a:spcPct val="100000"/>
-                        </a:lnSpc>
-                        <a:spcBef>
-                          <a:spcPts val="0"/>
-                        </a:spcBef>
-                        <a:spcAft>
-                          <a:spcPts val="0"/>
-                        </a:spcAft>
-                        <a:buClrTx/>
-                        <a:buSzTx/>
-                        <a:buFontTx/>
-                        <a:buNone/>
-                        <a:tabLst/>
-                        <a:defRPr/>
-                      </a:pPr>
-                      <a:r>
-                        <a:rPr lang="en-GB" dirty="0"/>
-                        <a:t>T</a:t>
-                      </a:r>
-                      <a:r>
-                        <a:rPr lang="en-GR" dirty="0"/>
-                        <a:t>op Tagger</a:t>
-                      </a:r>
-                    </a:p>
-                    <a:p>
-                      <a:pPr algn="ctr"/>
-                      <a:endParaRPr lang="en-GR" dirty="0"/>
-                    </a:p>
-                  </a:txBody>
-                  <a:tcPr/>
-                </a:tc>
-                <a:tc>
-                  <a:txBody>
-                    <a:bodyPr/>
-                    <a:lstStyle/>
-                    <a:p>
-                      <a:pPr algn="ctr"/>
-                      <a:r>
-                        <a:rPr lang="en-GR" dirty="0"/>
-                        <a:t>&gt; </a:t>
-                      </a:r>
-                      <a:r>
-                        <a:rPr lang="en-GR" dirty="0">
-                          <a:solidFill>
-                            <a:srgbClr val="00B0F0"/>
-                          </a:solidFill>
-                        </a:rPr>
-                        <a:t>0.2</a:t>
-                      </a:r>
-                      <a:r>
-                        <a:rPr lang="en-GR" dirty="0"/>
-                        <a:t>, </a:t>
-                      </a:r>
-                      <a:r>
-                        <a:rPr lang="en-GR" dirty="0">
-                          <a:solidFill>
-                            <a:srgbClr val="FF0000"/>
-                          </a:solidFill>
-                        </a:rPr>
-                        <a:t>0</a:t>
-                      </a:r>
-                      <a:r>
-                        <a:rPr lang="en-GR" dirty="0"/>
-                        <a:t>, </a:t>
-                      </a:r>
-                      <a:r>
-                        <a:rPr lang="en-GR" dirty="0">
-                          <a:solidFill>
-                            <a:srgbClr val="00B050"/>
-                          </a:solidFill>
-                        </a:rPr>
-                        <a:t>0.1</a:t>
-                      </a:r>
-                    </a:p>
-                  </a:txBody>
-                  <a:tcPr/>
-                </a:tc>
-                <a:extLst>
-                  <a:ext uri="{0D108BD9-81ED-4DB2-BD59-A6C34878D82A}">
-                    <a16:rowId xmlns:a16="http://schemas.microsoft.com/office/drawing/2014/main" val="1785673893"/>
-                  </a:ext>
-                </a:extLst>
-              </a:tr>
-              <a:tr h="581727">
-                <a:tc>
-                  <a:txBody>
-                    <a:bodyPr/>
-                    <a:lstStyle/>
-                    <a:p>
-                      <a:pPr algn="ctr"/>
-                      <a:r>
-                        <a:rPr lang="en-GR" dirty="0"/>
-                        <a:t>B tagging (2 btagged jets)</a:t>
-                      </a:r>
-                    </a:p>
-                  </a:txBody>
-                  <a:tcPr/>
-                </a:tc>
-                <a:tc>
-                  <a:txBody>
-                    <a:bodyPr/>
-                    <a:lstStyle/>
-                    <a:p>
-                      <a:pPr algn="ctr"/>
-                      <a:r>
-                        <a:rPr lang="en-GR" dirty="0"/>
-                        <a:t>&gt; </a:t>
-                      </a:r>
-                      <a:r>
-                        <a:rPr lang="en-GR" dirty="0">
-                          <a:solidFill>
-                            <a:srgbClr val="FF0000"/>
-                          </a:solidFill>
-                        </a:rPr>
-                        <a:t>Medium</a:t>
-                      </a:r>
-                      <a:r>
-                        <a:rPr lang="en-GR" dirty="0"/>
-                        <a:t> WP</a:t>
-                      </a:r>
-                    </a:p>
-                  </a:txBody>
-                  <a:tcPr/>
-                </a:tc>
-                <a:extLst>
-                  <a:ext uri="{0D108BD9-81ED-4DB2-BD59-A6C34878D82A}">
-                    <a16:rowId xmlns:a16="http://schemas.microsoft.com/office/drawing/2014/main" val="770137147"/>
-                  </a:ext>
-                </a:extLst>
-              </a:tr>
-              <a:tr h="581727">
-                <a:tc>
-                  <a:txBody>
-                    <a:bodyPr/>
-                    <a:lstStyle/>
-                    <a:p>
-                      <a:pPr algn="ctr"/>
-                      <a:r>
-                        <a:rPr lang="en-GR" dirty="0"/>
-                        <a:t>Signal Trigger</a:t>
-                      </a:r>
-                    </a:p>
-                  </a:txBody>
-                  <a:tcPr/>
-                </a:tc>
-                <a:tc>
-                  <a:txBody>
-                    <a:bodyPr/>
-                    <a:lstStyle/>
-                    <a:p>
-                      <a:pPr algn="ctr"/>
-                      <a:endParaRPr lang="en-GR" dirty="0"/>
-                    </a:p>
-                  </a:txBody>
-                  <a:tcPr/>
-                </a:tc>
-                <a:extLst>
-                  <a:ext uri="{0D108BD9-81ED-4DB2-BD59-A6C34878D82A}">
-                    <a16:rowId xmlns:a16="http://schemas.microsoft.com/office/drawing/2014/main" val="2405045937"/>
-                  </a:ext>
-                </a:extLst>
-              </a:tr>
-            </a:tbl>
-          </a:graphicData>
-        </a:graphic>
-      </p:graphicFrame>
-      <p:graphicFrame>
-        <p:nvGraphicFramePr>
-          <p:cNvPr id="10" name="Table 9">
-            <a:extLst>
-              <a:ext uri="{FF2B5EF4-FFF2-40B4-BE49-F238E27FC236}">
-                <a16:creationId xmlns:a16="http://schemas.microsoft.com/office/drawing/2014/main" id="{DAB3EDC7-2C81-A141-8F2F-14CEB014A448}"/>
-              </a:ext>
-            </a:extLst>
-          </p:cNvPr>
-          <p:cNvGraphicFramePr>
-            <a:graphicFrameLocks noGrp="1"/>
-          </p:cNvGraphicFramePr>
-          <p:nvPr/>
-        </p:nvGraphicFramePr>
-        <p:xfrm>
-          <a:off x="6844365" y="557852"/>
-          <a:ext cx="4368118" cy="5498871"/>
-        </p:xfrm>
-        <a:graphic>
-          <a:graphicData uri="http://schemas.openxmlformats.org/drawingml/2006/table">
-            <a:tbl>
-              <a:tblPr firstRow="1" bandRow="1">
-                <a:tableStyleId>{0660B408-B3CF-4A94-85FC-2B1E0A45F4A2}</a:tableStyleId>
-              </a:tblPr>
-              <a:tblGrid>
-                <a:gridCol w="2184059">
-                  <a:extLst>
-                    <a:ext uri="{9D8B030D-6E8A-4147-A177-3AD203B41FA5}">
-                      <a16:colId xmlns:a16="http://schemas.microsoft.com/office/drawing/2014/main" val="3731337435"/>
-                    </a:ext>
-                  </a:extLst>
-                </a:gridCol>
-                <a:gridCol w="2184059">
-                  <a:extLst>
-                    <a:ext uri="{9D8B030D-6E8A-4147-A177-3AD203B41FA5}">
-                      <a16:colId xmlns:a16="http://schemas.microsoft.com/office/drawing/2014/main" val="3688698510"/>
-                    </a:ext>
-                  </a:extLst>
-                </a:gridCol>
-              </a:tblGrid>
-              <a:tr h="430967">
-                <a:tc>
-                  <a:txBody>
-                    <a:bodyPr/>
-                    <a:lstStyle/>
-                    <a:p>
-                      <a:pPr algn="ctr"/>
-                      <a:r>
-                        <a:rPr lang="en-GR" dirty="0"/>
-                        <a:t>Variables</a:t>
-                      </a:r>
-                    </a:p>
-                  </a:txBody>
-                  <a:tcPr/>
-                </a:tc>
-                <a:tc>
-                  <a:txBody>
-                    <a:bodyPr/>
-                    <a:lstStyle/>
-                    <a:p>
-                      <a:pPr algn="ctr"/>
-                      <a:r>
-                        <a:rPr lang="en-GR" dirty="0"/>
-                        <a:t>Selected Cut</a:t>
-                      </a:r>
-                    </a:p>
-                  </a:txBody>
-                  <a:tcPr/>
-                </a:tc>
-                <a:extLst>
-                  <a:ext uri="{0D108BD9-81ED-4DB2-BD59-A6C34878D82A}">
-                    <a16:rowId xmlns:a16="http://schemas.microsoft.com/office/drawing/2014/main" val="1233017762"/>
-                  </a:ext>
-                </a:extLst>
-              </a:tr>
-              <a:tr h="494428">
-                <a:tc>
-                  <a:txBody>
-                    <a:bodyPr/>
-                    <a:lstStyle/>
-                    <a:p>
-                      <a:pPr algn="ctr"/>
-                      <a:r>
-                        <a:rPr lang="en-GR" dirty="0"/>
-                        <a:t>pT (both leading jets) </a:t>
-                      </a:r>
-                    </a:p>
-                  </a:txBody>
-                  <a:tcPr/>
-                </a:tc>
-                <a:tc>
-                  <a:txBody>
-                    <a:bodyPr/>
-                    <a:lstStyle/>
-                    <a:p>
-                      <a:pPr algn="ctr"/>
-                      <a:r>
-                        <a:rPr lang="en-GR" dirty="0"/>
-                        <a:t>&gt; 400 GeV</a:t>
-                      </a:r>
-                    </a:p>
-                  </a:txBody>
-                  <a:tcPr/>
-                </a:tc>
-                <a:extLst>
-                  <a:ext uri="{0D108BD9-81ED-4DB2-BD59-A6C34878D82A}">
-                    <a16:rowId xmlns:a16="http://schemas.microsoft.com/office/drawing/2014/main" val="1455770781"/>
-                  </a:ext>
-                </a:extLst>
-              </a:tr>
-              <a:tr h="430967">
-                <a:tc>
-                  <a:txBody>
-                    <a:bodyPr/>
-                    <a:lstStyle/>
-                    <a:p>
-                      <a:pPr algn="ctr"/>
-                      <a:r>
-                        <a:rPr lang="en-GR" dirty="0"/>
-                        <a:t>Njets </a:t>
-                      </a:r>
-                    </a:p>
-                  </a:txBody>
-                  <a:tcPr/>
-                </a:tc>
-                <a:tc>
-                  <a:txBody>
-                    <a:bodyPr/>
-                    <a:lstStyle/>
-                    <a:p>
-                      <a:pPr algn="ctr"/>
-                      <a:r>
-                        <a:rPr lang="en-GR" dirty="0"/>
-                        <a:t>&gt; 1</a:t>
-                      </a:r>
-                    </a:p>
-                  </a:txBody>
-                  <a:tcPr/>
-                </a:tc>
-                <a:extLst>
-                  <a:ext uri="{0D108BD9-81ED-4DB2-BD59-A6C34878D82A}">
-                    <a16:rowId xmlns:a16="http://schemas.microsoft.com/office/drawing/2014/main" val="3320086472"/>
-                  </a:ext>
-                </a:extLst>
-              </a:tr>
-              <a:tr h="605786">
-                <a:tc>
-                  <a:txBody>
-                    <a:bodyPr/>
-                    <a:lstStyle/>
-                    <a:p>
-                      <a:pPr marL="0" marR="0" lvl="0" indent="0" algn="ctr" defTabSz="914400" rtl="0" eaLnBrk="1" fontAlgn="auto" latinLnBrk="0" hangingPunct="1">
-                        <a:lnSpc>
-                          <a:spcPct val="100000"/>
-                        </a:lnSpc>
-                        <a:spcBef>
-                          <a:spcPts val="0"/>
-                        </a:spcBef>
-                        <a:spcAft>
-                          <a:spcPts val="0"/>
-                        </a:spcAft>
-                        <a:buClrTx/>
-                        <a:buSzTx/>
-                        <a:buFontTx/>
-                        <a:buNone/>
-                        <a:tabLst/>
-                        <a:defRPr/>
-                      </a:pPr>
-                      <a:r>
-                        <a:rPr lang="en-GR" dirty="0"/>
-                        <a:t>N leptons</a:t>
-                      </a:r>
-                    </a:p>
-                  </a:txBody>
-                  <a:tcPr/>
-                </a:tc>
-                <a:tc>
-                  <a:txBody>
-                    <a:bodyPr/>
-                    <a:lstStyle/>
-                    <a:p>
-                      <a:pPr algn="ctr"/>
-                      <a:r>
-                        <a:rPr lang="en-GR" dirty="0"/>
-                        <a:t>= 0</a:t>
-                      </a:r>
-                    </a:p>
-                  </a:txBody>
-                  <a:tcPr/>
-                </a:tc>
-                <a:extLst>
-                  <a:ext uri="{0D108BD9-81ED-4DB2-BD59-A6C34878D82A}">
-                    <a16:rowId xmlns:a16="http://schemas.microsoft.com/office/drawing/2014/main" val="1978738799"/>
-                  </a:ext>
-                </a:extLst>
-              </a:tr>
-              <a:tr h="629126">
-                <a:tc>
-                  <a:txBody>
-                    <a:bodyPr/>
-                    <a:lstStyle/>
-                    <a:p>
-                      <a:pPr algn="ctr"/>
-                      <a:r>
-                        <a:rPr lang="en-GR" dirty="0"/>
-                        <a:t>|eta| (both leading jets)</a:t>
-                      </a:r>
-                    </a:p>
-                  </a:txBody>
-                  <a:tcPr/>
-                </a:tc>
-                <a:tc>
-                  <a:txBody>
-                    <a:bodyPr/>
-                    <a:lstStyle/>
-                    <a:p>
-                      <a:pPr algn="ctr"/>
-                      <a:r>
-                        <a:rPr lang="en-GR" dirty="0"/>
-                        <a:t>&lt; 2.4</a:t>
-                      </a:r>
-                    </a:p>
-                  </a:txBody>
-                  <a:tcPr/>
-                </a:tc>
-                <a:extLst>
-                  <a:ext uri="{0D108BD9-81ED-4DB2-BD59-A6C34878D82A}">
-                    <a16:rowId xmlns:a16="http://schemas.microsoft.com/office/drawing/2014/main" val="2646382854"/>
-                  </a:ext>
-                </a:extLst>
-              </a:tr>
-              <a:tr h="430967">
-                <a:tc>
-                  <a:txBody>
-                    <a:bodyPr/>
-                    <a:lstStyle/>
-                    <a:p>
-                      <a:pPr algn="ctr"/>
-                      <a:r>
-                        <a:rPr lang="en-GR" dirty="0"/>
-                        <a:t>mJJ</a:t>
-                      </a:r>
-                    </a:p>
-                  </a:txBody>
-                  <a:tcPr/>
-                </a:tc>
-                <a:tc>
-                  <a:txBody>
-                    <a:bodyPr/>
-                    <a:lstStyle/>
-                    <a:p>
-                      <a:pPr algn="ctr"/>
-                      <a:r>
-                        <a:rPr lang="en-GR" dirty="0"/>
-                        <a:t>&gt; 1000 GeV</a:t>
-                      </a:r>
-                    </a:p>
-                  </a:txBody>
-                  <a:tcPr/>
-                </a:tc>
-                <a:extLst>
-                  <a:ext uri="{0D108BD9-81ED-4DB2-BD59-A6C34878D82A}">
-                    <a16:rowId xmlns:a16="http://schemas.microsoft.com/office/drawing/2014/main" val="1717255047"/>
-                  </a:ext>
-                </a:extLst>
-              </a:tr>
-              <a:tr h="629126">
-                <a:tc>
-                  <a:txBody>
-                    <a:bodyPr/>
-                    <a:lstStyle/>
-                    <a:p>
-                      <a:pPr algn="ctr"/>
-                      <a:r>
-                        <a:rPr lang="en-GR" dirty="0"/>
-                        <a:t>jetMassSoftDrop (only for fit)</a:t>
-                      </a:r>
-                    </a:p>
-                  </a:txBody>
-                  <a:tcPr/>
-                </a:tc>
-                <a:tc>
-                  <a:txBody>
-                    <a:bodyPr/>
-                    <a:lstStyle/>
-                    <a:p>
-                      <a:pPr algn="ctr"/>
-                      <a:r>
-                        <a:rPr lang="en-GR" dirty="0"/>
-                        <a:t>(50,300) GeV</a:t>
-                      </a:r>
-                    </a:p>
-                  </a:txBody>
-                  <a:tcPr/>
-                </a:tc>
-                <a:extLst>
-                  <a:ext uri="{0D108BD9-81ED-4DB2-BD59-A6C34878D82A}">
-                    <a16:rowId xmlns:a16="http://schemas.microsoft.com/office/drawing/2014/main" val="4172697806"/>
-                  </a:ext>
-                </a:extLst>
-              </a:tr>
-              <a:tr h="629126">
-                <a:tc>
-                  <a:txBody>
-                    <a:bodyPr/>
-                    <a:lstStyle/>
-                    <a:p>
-                      <a:pPr marL="0" marR="0" lvl="0" indent="0" algn="ctr" defTabSz="914400" rtl="0" eaLnBrk="1" fontAlgn="auto" latinLnBrk="0" hangingPunct="1">
-                        <a:lnSpc>
-                          <a:spcPct val="100000"/>
-                        </a:lnSpc>
-                        <a:spcBef>
-                          <a:spcPts val="0"/>
-                        </a:spcBef>
-                        <a:spcAft>
-                          <a:spcPts val="0"/>
-                        </a:spcAft>
-                        <a:buClrTx/>
-                        <a:buSzTx/>
-                        <a:buFontTx/>
-                        <a:buNone/>
-                        <a:tabLst/>
-                        <a:defRPr/>
-                      </a:pPr>
-                      <a:r>
-                        <a:rPr lang="en-GB" dirty="0"/>
-                        <a:t>T</a:t>
-                      </a:r>
-                      <a:r>
-                        <a:rPr lang="en-GR" dirty="0"/>
-                        <a:t>op Tagger</a:t>
-                      </a:r>
-                    </a:p>
-                    <a:p>
-                      <a:pPr algn="ctr"/>
-                      <a:endParaRPr lang="en-GR" dirty="0"/>
-                    </a:p>
-                  </a:txBody>
-                  <a:tcPr/>
-                </a:tc>
-                <a:tc>
-                  <a:txBody>
-                    <a:bodyPr/>
-                    <a:lstStyle/>
-                    <a:p>
-                      <a:pPr marL="0" marR="0" lvl="0" indent="0" algn="ctr" defTabSz="914400" rtl="0" eaLnBrk="1" fontAlgn="auto" latinLnBrk="0" hangingPunct="1">
-                        <a:lnSpc>
-                          <a:spcPct val="100000"/>
-                        </a:lnSpc>
-                        <a:spcBef>
-                          <a:spcPts val="0"/>
-                        </a:spcBef>
-                        <a:spcAft>
-                          <a:spcPts val="0"/>
-                        </a:spcAft>
-                        <a:buClrTx/>
-                        <a:buSzTx/>
-                        <a:buFontTx/>
-                        <a:buNone/>
-                        <a:tabLst/>
-                        <a:defRPr/>
-                      </a:pPr>
-                      <a:r>
-                        <a:rPr lang="en-GR" dirty="0"/>
-                        <a:t>&gt; </a:t>
-                      </a:r>
-                      <a:r>
-                        <a:rPr lang="en-GR" dirty="0">
-                          <a:solidFill>
-                            <a:srgbClr val="00B0F0"/>
-                          </a:solidFill>
-                        </a:rPr>
-                        <a:t>0.2</a:t>
-                      </a:r>
-                      <a:r>
-                        <a:rPr lang="en-GR" dirty="0"/>
-                        <a:t>, </a:t>
-                      </a:r>
-                      <a:r>
-                        <a:rPr lang="en-GR" dirty="0">
-                          <a:solidFill>
-                            <a:srgbClr val="FF0000"/>
-                          </a:solidFill>
-                        </a:rPr>
-                        <a:t>0</a:t>
-                      </a:r>
-                      <a:r>
-                        <a:rPr lang="en-GR" dirty="0"/>
-                        <a:t>, </a:t>
-                      </a:r>
-                      <a:r>
-                        <a:rPr lang="en-GR" dirty="0">
-                          <a:solidFill>
-                            <a:srgbClr val="00B050"/>
-                          </a:solidFill>
-                        </a:rPr>
-                        <a:t>0.1</a:t>
-                      </a:r>
-                    </a:p>
-                    <a:p>
-                      <a:pPr algn="ctr"/>
-                      <a:endParaRPr lang="en-GR" dirty="0"/>
-                    </a:p>
-                  </a:txBody>
-                  <a:tcPr/>
-                </a:tc>
-                <a:extLst>
-                  <a:ext uri="{0D108BD9-81ED-4DB2-BD59-A6C34878D82A}">
-                    <a16:rowId xmlns:a16="http://schemas.microsoft.com/office/drawing/2014/main" val="1785673893"/>
-                  </a:ext>
-                </a:extLst>
-              </a:tr>
-              <a:tr h="629126">
-                <a:tc>
-                  <a:txBody>
-                    <a:bodyPr/>
-                    <a:lstStyle/>
-                    <a:p>
-                      <a:pPr algn="ctr"/>
-                      <a:r>
-                        <a:rPr lang="en-GR" dirty="0"/>
-                        <a:t>B tagging (0 btagged jets)</a:t>
-                      </a:r>
-                    </a:p>
-                  </a:txBody>
-                  <a:tcPr/>
-                </a:tc>
-                <a:tc>
-                  <a:txBody>
-                    <a:bodyPr/>
-                    <a:lstStyle/>
-                    <a:p>
-                      <a:pPr algn="ctr"/>
-                      <a:r>
-                        <a:rPr lang="en-GR" dirty="0"/>
-                        <a:t>&lt; </a:t>
-                      </a:r>
-                      <a:r>
-                        <a:rPr lang="en-GR" dirty="0">
-                          <a:solidFill>
-                            <a:srgbClr val="FF0000"/>
-                          </a:solidFill>
-                        </a:rPr>
-                        <a:t>Medium</a:t>
-                      </a:r>
-                      <a:r>
-                        <a:rPr lang="en-GR" dirty="0"/>
-                        <a:t> WP</a:t>
-                      </a:r>
-                    </a:p>
-                  </a:txBody>
-                  <a:tcPr/>
-                </a:tc>
-                <a:extLst>
-                  <a:ext uri="{0D108BD9-81ED-4DB2-BD59-A6C34878D82A}">
-                    <a16:rowId xmlns:a16="http://schemas.microsoft.com/office/drawing/2014/main" val="770137147"/>
-                  </a:ext>
-                </a:extLst>
-              </a:tr>
-              <a:tr h="545436">
-                <a:tc>
-                  <a:txBody>
-                    <a:bodyPr/>
-                    <a:lstStyle/>
-                    <a:p>
-                      <a:pPr algn="ctr"/>
-                      <a:r>
-                        <a:rPr lang="en-GR" dirty="0"/>
-                        <a:t>Control Trigger</a:t>
-                      </a:r>
-                    </a:p>
-                  </a:txBody>
-                  <a:tcPr/>
-                </a:tc>
-                <a:tc>
-                  <a:txBody>
-                    <a:bodyPr/>
-                    <a:lstStyle/>
-                    <a:p>
-                      <a:pPr algn="ctr"/>
-                      <a:endParaRPr lang="en-GR" dirty="0"/>
-                    </a:p>
-                  </a:txBody>
-                  <a:tcPr/>
-                </a:tc>
-                <a:extLst>
-                  <a:ext uri="{0D108BD9-81ED-4DB2-BD59-A6C34878D82A}">
-                    <a16:rowId xmlns:a16="http://schemas.microsoft.com/office/drawing/2014/main" val="1181864082"/>
-                  </a:ext>
-                </a:extLst>
-              </a:tr>
-            </a:tbl>
-          </a:graphicData>
-        </a:graphic>
-      </p:graphicFrame>
-      <p:sp>
-        <p:nvSpPr>
-          <p:cNvPr id="11" name="TextBox 10">
-            <a:extLst>
-              <a:ext uri="{FF2B5EF4-FFF2-40B4-BE49-F238E27FC236}">
-                <a16:creationId xmlns:a16="http://schemas.microsoft.com/office/drawing/2014/main" id="{9E9DDF71-90B0-C245-8A52-0A505D755F00}"/>
+                <a16:creationId xmlns:a16="http://schemas.microsoft.com/office/drawing/2014/main" id="{604C635C-AFB0-6A45-A110-C274ACEF6636}"/>
               </a:ext>
             </a:extLst>
           </p:cNvPr>
@@ -14061,8 +15191,8 @@
         </p:nvSpPr>
         <p:spPr>
           <a:xfrm>
-            <a:off x="7423707" y="65430"/>
-            <a:ext cx="3291946" cy="430887"/>
+            <a:off x="-60194" y="4668000"/>
+            <a:ext cx="2023672" cy="369332"/>
           </a:xfrm>
           <a:prstGeom prst="rect">
             <a:avLst/>
@@ -14076,13 +15206,258 @@
           <a:lstStyle/>
           <a:p>
             <a:r>
-              <a:rPr lang="en-US" sz="2200" dirty="0">
+              <a:rPr lang="en-GR" dirty="0">
                 <a:solidFill>
                   <a:srgbClr val="FF0000"/>
                 </a:solidFill>
-                <a:sym typeface="Wingdings" pitchFamily="2" charset="2"/>
               </a:rPr>
-              <a:t>Control Region Selection</a:t>
+              <a:t>M</a:t>
+            </a:r>
+            <a:r>
+              <a:rPr lang="en-GR" baseline="-25000" dirty="0">
+                <a:solidFill>
+                  <a:srgbClr val="FF0000"/>
+                </a:solidFill>
+              </a:rPr>
+              <a:t>z’ </a:t>
+            </a:r>
+            <a:r>
+              <a:rPr lang="en-GR" dirty="0">
+                <a:solidFill>
+                  <a:srgbClr val="FF0000"/>
+                </a:solidFill>
+              </a:rPr>
+              <a:t>=2000, w = 10%</a:t>
+            </a:r>
+          </a:p>
+        </p:txBody>
+      </p:sp>
+      <p:pic>
+        <p:nvPicPr>
+          <p:cNvPr id="4" name="Picture 3">
+            <a:extLst>
+              <a:ext uri="{FF2B5EF4-FFF2-40B4-BE49-F238E27FC236}">
+                <a16:creationId xmlns:a16="http://schemas.microsoft.com/office/drawing/2014/main" id="{BDEC8590-D33A-B24D-97F2-1A8A5B8D34EC}"/>
+              </a:ext>
+            </a:extLst>
+          </p:cNvPr>
+          <p:cNvPicPr>
+            <a:picLocks noChangeAspect="1"/>
+          </p:cNvPicPr>
+          <p:nvPr/>
+        </p:nvPicPr>
+        <p:blipFill>
+          <a:blip r:embed="rId2"/>
+          <a:stretch>
+            <a:fillRect/>
+          </a:stretch>
+        </p:blipFill>
+        <p:spPr>
+          <a:xfrm rot="5400000">
+            <a:off x="2719619" y="-361734"/>
+            <a:ext cx="2904363" cy="4536567"/>
+          </a:xfrm>
+          <a:prstGeom prst="rect">
+            <a:avLst/>
+          </a:prstGeom>
+        </p:spPr>
+      </p:pic>
+      <p:pic>
+        <p:nvPicPr>
+          <p:cNvPr id="6" name="Picture 5">
+            <a:extLst>
+              <a:ext uri="{FF2B5EF4-FFF2-40B4-BE49-F238E27FC236}">
+                <a16:creationId xmlns:a16="http://schemas.microsoft.com/office/drawing/2014/main" id="{C0023AE5-0F48-F94D-A247-2AB3B405A796}"/>
+              </a:ext>
+            </a:extLst>
+          </p:cNvPr>
+          <p:cNvPicPr>
+            <a:picLocks noChangeAspect="1"/>
+          </p:cNvPicPr>
+          <p:nvPr/>
+        </p:nvPicPr>
+        <p:blipFill>
+          <a:blip r:embed="rId3"/>
+          <a:stretch>
+            <a:fillRect/>
+          </a:stretch>
+        </p:blipFill>
+        <p:spPr>
+          <a:xfrm rot="5400000">
+            <a:off x="2719620" y="2584382"/>
+            <a:ext cx="2904363" cy="4536567"/>
+          </a:xfrm>
+          <a:prstGeom prst="rect">
+            <a:avLst/>
+          </a:prstGeom>
+        </p:spPr>
+      </p:pic>
+      <p:pic>
+        <p:nvPicPr>
+          <p:cNvPr id="9" name="Picture 8">
+            <a:extLst>
+              <a:ext uri="{FF2B5EF4-FFF2-40B4-BE49-F238E27FC236}">
+                <a16:creationId xmlns:a16="http://schemas.microsoft.com/office/drawing/2014/main" id="{4FCA774E-1E55-CC43-9F17-9EF3AFA83BAC}"/>
+              </a:ext>
+            </a:extLst>
+          </p:cNvPr>
+          <p:cNvPicPr>
+            <a:picLocks noChangeAspect="1"/>
+          </p:cNvPicPr>
+          <p:nvPr/>
+        </p:nvPicPr>
+        <p:blipFill>
+          <a:blip r:embed="rId4"/>
+          <a:stretch>
+            <a:fillRect/>
+          </a:stretch>
+        </p:blipFill>
+        <p:spPr>
+          <a:xfrm rot="5400000">
+            <a:off x="7026565" y="-208295"/>
+            <a:ext cx="2904363" cy="4536567"/>
+          </a:xfrm>
+          <a:prstGeom prst="rect">
+            <a:avLst/>
+          </a:prstGeom>
+        </p:spPr>
+      </p:pic>
+      <p:pic>
+        <p:nvPicPr>
+          <p:cNvPr id="12" name="Picture 11">
+            <a:extLst>
+              <a:ext uri="{FF2B5EF4-FFF2-40B4-BE49-F238E27FC236}">
+                <a16:creationId xmlns:a16="http://schemas.microsoft.com/office/drawing/2014/main" id="{15BF9934-9166-C74D-A6EE-88ADE13B2856}"/>
+              </a:ext>
+            </a:extLst>
+          </p:cNvPr>
+          <p:cNvPicPr>
+            <a:picLocks noChangeAspect="1"/>
+          </p:cNvPicPr>
+          <p:nvPr/>
+        </p:nvPicPr>
+        <p:blipFill>
+          <a:blip r:embed="rId5"/>
+          <a:stretch>
+            <a:fillRect/>
+          </a:stretch>
+        </p:blipFill>
+        <p:spPr>
+          <a:xfrm rot="5400000">
+            <a:off x="7026565" y="2584382"/>
+            <a:ext cx="2904363" cy="4536567"/>
+          </a:xfrm>
+          <a:prstGeom prst="rect">
+            <a:avLst/>
+          </a:prstGeom>
+        </p:spPr>
+      </p:pic>
+      <p:sp>
+        <p:nvSpPr>
+          <p:cNvPr id="23" name="TextBox 22">
+            <a:extLst>
+              <a:ext uri="{FF2B5EF4-FFF2-40B4-BE49-F238E27FC236}">
+                <a16:creationId xmlns:a16="http://schemas.microsoft.com/office/drawing/2014/main" id="{7328C7EA-20B2-594C-95E0-5D0A7AB50953}"/>
+              </a:ext>
+            </a:extLst>
+          </p:cNvPr>
+          <p:cNvSpPr txBox="1"/>
+          <p:nvPr/>
+        </p:nvSpPr>
+        <p:spPr>
+          <a:xfrm>
+            <a:off x="10258268" y="1690657"/>
+            <a:ext cx="2023672" cy="369332"/>
+          </a:xfrm>
+          <a:prstGeom prst="rect">
+            <a:avLst/>
+          </a:prstGeom>
+          <a:noFill/>
+        </p:spPr>
+        <p:txBody>
+          <a:bodyPr wrap="square" rtlCol="0">
+            <a:spAutoFit/>
+          </a:bodyPr>
+          <a:lstStyle/>
+          <a:p>
+            <a:r>
+              <a:rPr lang="en-GR" dirty="0">
+                <a:solidFill>
+                  <a:srgbClr val="FF0000"/>
+                </a:solidFill>
+              </a:rPr>
+              <a:t>M</a:t>
+            </a:r>
+            <a:r>
+              <a:rPr lang="en-GR" baseline="-25000" dirty="0">
+                <a:solidFill>
+                  <a:srgbClr val="FF0000"/>
+                </a:solidFill>
+              </a:rPr>
+              <a:t>z’ </a:t>
+            </a:r>
+            <a:r>
+              <a:rPr lang="en-GR" dirty="0">
+                <a:solidFill>
+                  <a:srgbClr val="FF0000"/>
+                </a:solidFill>
+              </a:rPr>
+              <a:t>=2500, w = 1%</a:t>
+            </a:r>
+          </a:p>
+        </p:txBody>
+      </p:sp>
+      <p:sp>
+        <p:nvSpPr>
+          <p:cNvPr id="24" name="TextBox 23">
+            <a:extLst>
+              <a:ext uri="{FF2B5EF4-FFF2-40B4-BE49-F238E27FC236}">
+                <a16:creationId xmlns:a16="http://schemas.microsoft.com/office/drawing/2014/main" id="{2F899BD0-5148-EE45-9F57-F54E80881C8C}"/>
+              </a:ext>
+            </a:extLst>
+          </p:cNvPr>
+          <p:cNvSpPr txBox="1"/>
+          <p:nvPr/>
+        </p:nvSpPr>
+        <p:spPr>
+          <a:xfrm>
+            <a:off x="10258268" y="4668000"/>
+            <a:ext cx="2023672" cy="369332"/>
+          </a:xfrm>
+          <a:prstGeom prst="rect">
+            <a:avLst/>
+          </a:prstGeom>
+          <a:noFill/>
+        </p:spPr>
+        <p:txBody>
+          <a:bodyPr wrap="square" rtlCol="0">
+            <a:spAutoFit/>
+          </a:bodyPr>
+          <a:lstStyle/>
+          <a:p>
+            <a:r>
+              <a:rPr lang="en-GR" dirty="0">
+                <a:solidFill>
+                  <a:srgbClr val="FF0000"/>
+                </a:solidFill>
+              </a:rPr>
+              <a:t>M</a:t>
+            </a:r>
+            <a:r>
+              <a:rPr lang="en-GR" baseline="-25000" dirty="0">
+                <a:solidFill>
+                  <a:srgbClr val="FF0000"/>
+                </a:solidFill>
+              </a:rPr>
+              <a:t>z’ </a:t>
+            </a:r>
+            <a:r>
+              <a:rPr lang="en-GR" dirty="0">
+                <a:solidFill>
+                  <a:srgbClr val="FF0000"/>
+                </a:solidFill>
+              </a:rPr>
+              <a:t>=2500, w = 10%</a:t>
             </a:r>
           </a:p>
         </p:txBody>
@@ -14090,7 +15465,7 @@
     </p:spTree>
     <p:extLst>
       <p:ext uri="{BB962C8B-B14F-4D97-AF65-F5344CB8AC3E}">
-        <p14:creationId xmlns:p14="http://schemas.microsoft.com/office/powerpoint/2010/main" val="814623943"/>
+        <p14:creationId xmlns:p14="http://schemas.microsoft.com/office/powerpoint/2010/main" val="1572914577"/>
       </p:ext>
     </p:extLst>
   </p:cSld>

</xml_diff>